<commit_message>
fft added in the analysis
</commit_message>
<xml_diff>
--- a/Documentation/3. in-depth spectrum analysis.pptx
+++ b/Documentation/3. in-depth spectrum analysis.pptx
@@ -221,7 +221,7 @@
           <a:p>
             <a:fld id="{1A21894F-B278-4D96-9594-A030EA633187}" type="datetimeFigureOut">
               <a:rPr lang="it-IT" smtClean="0"/>
-              <a:t>29/08/2024</a:t>
+              <a:t>30/08/2024</a:t>
             </a:fld>
             <a:endParaRPr lang="it-IT"/>
           </a:p>
@@ -2941,7 +2941,7 @@
           <a:p>
             <a:fld id="{58E4D78B-0F35-4E3B-A0B9-554BA787D8A4}" type="datetime1">
               <a:rPr lang="en-US" smtClean="0"/>
-              <a:t>8/29/2024</a:t>
+              <a:t>8/30/2024</a:t>
             </a:fld>
             <a:endParaRPr lang="en-US"/>
           </a:p>
@@ -3151,7 +3151,7 @@
           <a:p>
             <a:fld id="{604487E5-BE79-4BAC-AEB7-0CE0533B5E5C}" type="datetime1">
               <a:rPr lang="en-US" smtClean="0"/>
-              <a:t>8/29/2024</a:t>
+              <a:t>8/30/2024</a:t>
             </a:fld>
             <a:endParaRPr lang="en-US"/>
           </a:p>
@@ -3351,7 +3351,7 @@
           <a:p>
             <a:fld id="{DDA7E0CB-9E21-49FD-99A0-0CD75BBC45F4}" type="datetime1">
               <a:rPr lang="en-US" smtClean="0"/>
-              <a:t>8/29/2024</a:t>
+              <a:t>8/30/2024</a:t>
             </a:fld>
             <a:endParaRPr lang="en-US"/>
           </a:p>
@@ -3627,7 +3627,7 @@
           <a:p>
             <a:fld id="{661D7149-FE96-419A-8F67-9BD351842985}" type="datetime1">
               <a:rPr lang="en-US" smtClean="0"/>
-              <a:t>8/29/2024</a:t>
+              <a:t>8/30/2024</a:t>
             </a:fld>
             <a:endParaRPr lang="en-US"/>
           </a:p>
@@ -3895,7 +3895,7 @@
           <a:p>
             <a:fld id="{6CA97CEF-DD94-4A20-85BC-5094F3EA8887}" type="datetime1">
               <a:rPr lang="en-US" smtClean="0"/>
-              <a:t>8/29/2024</a:t>
+              <a:t>8/30/2024</a:t>
             </a:fld>
             <a:endParaRPr lang="en-US"/>
           </a:p>
@@ -4310,7 +4310,7 @@
           <a:p>
             <a:fld id="{9862EB4C-45F8-47BA-B435-B6097D61B684}" type="datetime1">
               <a:rPr lang="en-US" smtClean="0"/>
-              <a:t>8/29/2024</a:t>
+              <a:t>8/30/2024</a:t>
             </a:fld>
             <a:endParaRPr lang="en-US"/>
           </a:p>
@@ -4452,7 +4452,7 @@
           <a:p>
             <a:fld id="{FA7CD0E2-B7EC-4D81-9389-8F889EE865AB}" type="datetime1">
               <a:rPr lang="en-US" smtClean="0"/>
-              <a:t>8/29/2024</a:t>
+              <a:t>8/30/2024</a:t>
             </a:fld>
             <a:endParaRPr lang="en-US"/>
           </a:p>
@@ -4565,7 +4565,7 @@
           <a:p>
             <a:fld id="{18B47F5C-7FA0-44DA-BF82-413AB90208B7}" type="datetime1">
               <a:rPr lang="en-US" smtClean="0"/>
-              <a:t>8/29/2024</a:t>
+              <a:t>8/30/2024</a:t>
             </a:fld>
             <a:endParaRPr lang="en-US"/>
           </a:p>
@@ -4878,7 +4878,7 @@
           <a:p>
             <a:fld id="{403415A8-F8BD-47CC-8D20-53798396961D}" type="datetime1">
               <a:rPr lang="en-US" smtClean="0"/>
-              <a:t>8/29/2024</a:t>
+              <a:t>8/30/2024</a:t>
             </a:fld>
             <a:endParaRPr lang="en-US"/>
           </a:p>
@@ -5167,7 +5167,7 @@
           <a:p>
             <a:fld id="{6A12F5A1-6669-4CDD-B1B4-04FFE5C41ADE}" type="datetime1">
               <a:rPr lang="en-US" smtClean="0"/>
-              <a:t>8/29/2024</a:t>
+              <a:t>8/30/2024</a:t>
             </a:fld>
             <a:endParaRPr lang="en-US"/>
           </a:p>
@@ -5371,7 +5371,7 @@
           <a:p>
             <a:fld id="{63421662-C242-4258-8799-9F32C0D7CC75}" type="datetime1">
               <a:rPr lang="en-US" smtClean="0"/>
-              <a:t>8/29/2024</a:t>
+              <a:t>8/30/2024</a:t>
             </a:fld>
             <a:endParaRPr lang="en-US"/>
           </a:p>
@@ -7858,7 +7858,13 @@
           <a:p>
             <a:r>
               <a:rPr lang="en-US" sz="1800" dirty="0"/>
-              <a:t>Consistent estimation of the spectrum</a:t>
+              <a:t>Require a zero-mean signal as input of the estimator of the model </a:t>
+            </a:r>
+          </a:p>
+          <a:p>
+            <a:r>
+              <a:rPr lang="en-US" sz="1800" dirty="0"/>
+              <a:t>Consistent and not windowed estimation of the spectrum</a:t>
             </a:r>
           </a:p>
           <a:p>
@@ -8848,6 +8854,60 @@
             <a:endParaRPr lang="en-GB" sz="1800" dirty="0">
               <a:latin typeface="+mj-lt"/>
             </a:endParaRPr>
+          </a:p>
+        </p:txBody>
+      </p:sp>
+      <p:sp>
+        <p:nvSpPr>
+          <p:cNvPr id="3" name="Rettangolo con angoli arrotondati 2">
+            <a:extLst>
+              <a:ext uri="{FF2B5EF4-FFF2-40B4-BE49-F238E27FC236}">
+                <a16:creationId xmlns:a16="http://schemas.microsoft.com/office/drawing/2014/main" id="{07E9ABDE-4C50-34C5-80B9-69EE88D68B31}"/>
+              </a:ext>
+            </a:extLst>
+          </p:cNvPr>
+          <p:cNvSpPr/>
+          <p:nvPr/>
+        </p:nvSpPr>
+        <p:spPr>
+          <a:xfrm>
+            <a:off x="838200" y="4489704"/>
+            <a:ext cx="9503664" cy="1682496"/>
+          </a:xfrm>
+          <a:prstGeom prst="roundRect">
+            <a:avLst/>
+          </a:prstGeom>
+          <a:noFill/>
+          <a:ln w="19050" cap="flat" cmpd="sng" algn="ctr">
+            <a:solidFill>
+              <a:schemeClr val="accent5"/>
+            </a:solidFill>
+            <a:prstDash val="solid"/>
+            <a:round/>
+            <a:headEnd type="none" w="med" len="med"/>
+            <a:tailEnd type="none" w="med" len="med"/>
+          </a:ln>
+        </p:spPr>
+        <p:style>
+          <a:lnRef idx="0">
+            <a:scrgbClr r="0" g="0" b="0"/>
+          </a:lnRef>
+          <a:fillRef idx="0">
+            <a:scrgbClr r="0" g="0" b="0"/>
+          </a:fillRef>
+          <a:effectRef idx="0">
+            <a:scrgbClr r="0" g="0" b="0"/>
+          </a:effectRef>
+          <a:fontRef idx="minor">
+            <a:schemeClr val="accent5"/>
+          </a:fontRef>
+        </p:style>
+        <p:txBody>
+          <a:bodyPr rtlCol="0" anchor="ctr"/>
+          <a:lstStyle/>
+          <a:p>
+            <a:pPr algn="ctr"/>
+            <a:endParaRPr lang="it-IT"/>
           </a:p>
         </p:txBody>
       </p:sp>
@@ -9494,6 +9554,41 @@
                                   </p:childTnLst>
                                 </p:cTn>
                               </p:par>
+                              <p:par>
+                                <p:cTn id="35" presetID="6" presetClass="entr" presetSubtype="32" fill="hold" grpId="0" nodeType="withEffect">
+                                  <p:stCondLst>
+                                    <p:cond delay="0"/>
+                                  </p:stCondLst>
+                                  <p:childTnLst>
+                                    <p:set>
+                                      <p:cBhvr>
+                                        <p:cTn id="36" dur="1" fill="hold">
+                                          <p:stCondLst>
+                                            <p:cond delay="0"/>
+                                          </p:stCondLst>
+                                        </p:cTn>
+                                        <p:tgtEl>
+                                          <p:spTgt spid="3"/>
+                                        </p:tgtEl>
+                                        <p:attrNameLst>
+                                          <p:attrName>style.visibility</p:attrName>
+                                        </p:attrNameLst>
+                                      </p:cBhvr>
+                                      <p:to>
+                                        <p:strVal val="visible"/>
+                                      </p:to>
+                                    </p:set>
+                                    <p:animEffect transition="in" filter="circle(out)">
+                                      <p:cBhvr>
+                                        <p:cTn id="37" dur="500"/>
+                                        <p:tgtEl>
+                                          <p:spTgt spid="3"/>
+                                        </p:tgtEl>
+                                      </p:cBhvr>
+                                    </p:animEffect>
+                                  </p:childTnLst>
+                                </p:cTn>
+                              </p:par>
                             </p:childTnLst>
                           </p:cTn>
                         </p:par>
@@ -9501,26 +9596,26 @@
                     </p:cTn>
                   </p:par>
                   <p:par>
-                    <p:cTn id="35" fill="hold">
+                    <p:cTn id="38" fill="hold">
                       <p:stCondLst>
                         <p:cond delay="indefinite"/>
                       </p:stCondLst>
                       <p:childTnLst>
                         <p:par>
-                          <p:cTn id="36" fill="hold">
+                          <p:cTn id="39" fill="hold">
                             <p:stCondLst>
                               <p:cond delay="0"/>
                             </p:stCondLst>
                             <p:childTnLst>
                               <p:par>
-                                <p:cTn id="37" presetID="2" presetClass="entr" presetSubtype="4" fill="hold" nodeType="clickEffect">
+                                <p:cTn id="40" presetID="2" presetClass="entr" presetSubtype="4" fill="hold" nodeType="clickEffect">
                                   <p:stCondLst>
                                     <p:cond delay="0"/>
                                   </p:stCondLst>
                                   <p:childTnLst>
                                     <p:set>
                                       <p:cBhvr>
-                                        <p:cTn id="38" dur="1" fill="hold">
+                                        <p:cTn id="41" dur="1" fill="hold">
                                           <p:stCondLst>
                                             <p:cond delay="0"/>
                                           </p:stCondLst>
@@ -9542,7 +9637,7 @@
                                     </p:set>
                                     <p:anim calcmode="lin" valueType="num">
                                       <p:cBhvr additive="base">
-                                        <p:cTn id="39" dur="500" fill="hold"/>
+                                        <p:cTn id="42" dur="500" fill="hold"/>
                                         <p:tgtEl>
                                           <p:spTgt spid="22">
                                             <p:txEl>
@@ -9569,7 +9664,7 @@
                                     </p:anim>
                                     <p:anim calcmode="lin" valueType="num">
                                       <p:cBhvr additive="base">
-                                        <p:cTn id="40" dur="500" fill="hold"/>
+                                        <p:cTn id="43" dur="500" fill="hold"/>
                                         <p:tgtEl>
                                           <p:spTgt spid="22">
                                             <p:txEl>
@@ -9598,14 +9693,14 @@
                                 </p:cTn>
                               </p:par>
                               <p:par>
-                                <p:cTn id="41" presetID="2" presetClass="entr" presetSubtype="4" fill="hold" nodeType="withEffect">
+                                <p:cTn id="44" presetID="2" presetClass="entr" presetSubtype="4" fill="hold" nodeType="withEffect">
                                   <p:stCondLst>
                                     <p:cond delay="0"/>
                                   </p:stCondLst>
                                   <p:childTnLst>
                                     <p:set>
                                       <p:cBhvr>
-                                        <p:cTn id="42" dur="1" fill="hold">
+                                        <p:cTn id="45" dur="1" fill="hold">
                                           <p:stCondLst>
                                             <p:cond delay="0"/>
                                           </p:stCondLst>
@@ -9627,7 +9722,7 @@
                                     </p:set>
                                     <p:anim calcmode="lin" valueType="num">
                                       <p:cBhvr additive="base">
-                                        <p:cTn id="43" dur="500" fill="hold"/>
+                                        <p:cTn id="46" dur="500" fill="hold"/>
                                         <p:tgtEl>
                                           <p:spTgt spid="22">
                                             <p:txEl>
@@ -9654,7 +9749,7 @@
                                     </p:anim>
                                     <p:anim calcmode="lin" valueType="num">
                                       <p:cBhvr additive="base">
-                                        <p:cTn id="44" dur="500" fill="hold"/>
+                                        <p:cTn id="47" dur="500" fill="hold"/>
                                         <p:tgtEl>
                                           <p:spTgt spid="22">
                                             <p:txEl>
@@ -9683,14 +9778,14 @@
                                 </p:cTn>
                               </p:par>
                               <p:par>
-                                <p:cTn id="45" presetID="2" presetClass="entr" presetSubtype="4" fill="hold" nodeType="withEffect">
+                                <p:cTn id="48" presetID="2" presetClass="entr" presetSubtype="4" fill="hold" nodeType="withEffect">
                                   <p:stCondLst>
                                     <p:cond delay="0"/>
                                   </p:stCondLst>
                                   <p:childTnLst>
                                     <p:set>
                                       <p:cBhvr>
-                                        <p:cTn id="46" dur="1" fill="hold">
+                                        <p:cTn id="49" dur="1" fill="hold">
                                           <p:stCondLst>
                                             <p:cond delay="0"/>
                                           </p:stCondLst>
@@ -9712,7 +9807,7 @@
                                     </p:set>
                                     <p:anim calcmode="lin" valueType="num">
                                       <p:cBhvr additive="base">
-                                        <p:cTn id="47" dur="500" fill="hold"/>
+                                        <p:cTn id="50" dur="500" fill="hold"/>
                                         <p:tgtEl>
                                           <p:spTgt spid="22">
                                             <p:txEl>
@@ -9739,7 +9834,7 @@
                                     </p:anim>
                                     <p:anim calcmode="lin" valueType="num">
                                       <p:cBhvr additive="base">
-                                        <p:cTn id="48" dur="500" fill="hold"/>
+                                        <p:cTn id="51" dur="500" fill="hold"/>
                                         <p:tgtEl>
                                           <p:spTgt spid="22">
                                             <p:txEl>
@@ -9794,6 +9889,9 @@
         </p:cTn>
       </p:par>
     </p:tnLst>
+    <p:bldLst>
+      <p:bldP spid="3" grpId="0" animBg="1"/>
+    </p:bldLst>
   </p:timing>
 </p:sld>
 </file>
@@ -12857,7 +12955,79 @@
               <a:rPr lang="en-GB" sz="1800" dirty="0">
                 <a:latin typeface="+mj-lt"/>
               </a:rPr>
-              <a:t>For all these scenarios have been plotted the spectrums compared with the Welch spectrum</a:t>
+              <a:t>For all these scenarios have been plotted the </a:t>
+            </a:r>
+            <a:r>
+              <a:rPr lang="en-GB" sz="1800" b="1" dirty="0">
+                <a:latin typeface="+mj-lt"/>
+              </a:rPr>
+              <a:t>AR</a:t>
+            </a:r>
+            <a:r>
+              <a:rPr lang="en-GB" sz="1800" dirty="0">
+                <a:latin typeface="+mj-lt"/>
+              </a:rPr>
+              <a:t> </a:t>
+            </a:r>
+            <a:r>
+              <a:rPr lang="en-GB" sz="1800" b="1" dirty="0">
+                <a:latin typeface="+mj-lt"/>
+              </a:rPr>
+              <a:t>spectrums</a:t>
+            </a:r>
+            <a:r>
+              <a:rPr lang="en-GB" sz="1800" dirty="0">
+                <a:latin typeface="+mj-lt"/>
+              </a:rPr>
+              <a:t> </a:t>
+            </a:r>
+            <a:r>
+              <a:rPr lang="en-GB" sz="1800" b="1" dirty="0">
+                <a:latin typeface="+mj-lt"/>
+              </a:rPr>
+              <a:t>compared</a:t>
+            </a:r>
+            <a:r>
+              <a:rPr lang="en-GB" sz="1800" dirty="0">
+                <a:latin typeface="+mj-lt"/>
+              </a:rPr>
+              <a:t> </a:t>
+            </a:r>
+            <a:r>
+              <a:rPr lang="en-GB" sz="1800" b="1" dirty="0">
+                <a:latin typeface="+mj-lt"/>
+              </a:rPr>
+              <a:t>with</a:t>
+            </a:r>
+            <a:r>
+              <a:rPr lang="en-GB" sz="1800" dirty="0">
+                <a:latin typeface="+mj-lt"/>
+              </a:rPr>
+              <a:t> the </a:t>
+            </a:r>
+            <a:r>
+              <a:rPr lang="en-GB" sz="1800" b="1" dirty="0">
+                <a:latin typeface="+mj-lt"/>
+              </a:rPr>
+              <a:t>Welch</a:t>
+            </a:r>
+            <a:r>
+              <a:rPr lang="en-GB" sz="1800" dirty="0">
+                <a:latin typeface="+mj-lt"/>
+              </a:rPr>
+              <a:t> spectrum and the </a:t>
+            </a:r>
+            <a:r>
+              <a:rPr lang="en-GB" sz="1800" b="1" dirty="0">
+                <a:latin typeface="+mj-lt"/>
+              </a:rPr>
+              <a:t>Periodogram</a:t>
+            </a:r>
+            <a:r>
+              <a:rPr lang="en-GB" sz="1800" dirty="0">
+                <a:latin typeface="+mj-lt"/>
+              </a:rPr>
+              <a:t> </a:t>
             </a:r>
           </a:p>
           <a:p>
@@ -13608,7 +13778,7 @@
       </p:sp>
       <p:pic>
         <p:nvPicPr>
-          <p:cNvPr id="5" name="Immagine 4" descr="Immagine che contiene testo, linea, Diagramma, diagramma&#10;&#10;Descrizione generata automaticamente">
+          <p:cNvPr id="5" name="Immagine 4">
             <a:extLst>
               <a:ext uri="{FF2B5EF4-FFF2-40B4-BE49-F238E27FC236}">
                 <a16:creationId xmlns:a16="http://schemas.microsoft.com/office/drawing/2014/main" id="{C1BA084F-83E1-91E1-5BEC-673C60AB3B22}"/>
@@ -13628,13 +13798,13 @@
               </a:ext>
             </a:extLst>
           </a:blip>
-          <a:srcRect l="10027" t="6346" r="8940" b="3805"/>
+          <a:srcRect l="9915" t="4227" r="8430" b="3141"/>
           <a:stretch/>
         </p:blipFill>
         <p:spPr>
           <a:xfrm>
-            <a:off x="4630267" y="1745081"/>
-            <a:ext cx="7183055" cy="4090151"/>
+            <a:off x="4443984" y="1917962"/>
+            <a:ext cx="7088654" cy="4198456"/>
           </a:xfrm>
           <a:prstGeom prst="rect">
             <a:avLst/>
@@ -13668,7 +13838,7 @@
         </p:blipFill>
         <p:spPr>
           <a:xfrm>
-            <a:off x="4630267" y="1649825"/>
+            <a:off x="4359523" y="1945481"/>
             <a:ext cx="7173115" cy="2140331"/>
           </a:xfrm>
           <a:prstGeom prst="rect">
@@ -13678,7 +13848,7 @@
       </p:pic>
       <p:pic>
         <p:nvPicPr>
-          <p:cNvPr id="10" name="Immagine 9" descr="Immagine che contiene testo, diagramma, Piano, mappa&#10;&#10;Descrizione generata automaticamente">
+          <p:cNvPr id="10" name="Immagine 9">
             <a:extLst>
               <a:ext uri="{FF2B5EF4-FFF2-40B4-BE49-F238E27FC236}">
                 <a16:creationId xmlns:a16="http://schemas.microsoft.com/office/drawing/2014/main" id="{3857F806-D744-606D-C84D-7720F99012A0}"/>
@@ -13690,7 +13860,7 @@
           </p:cNvPicPr>
           <p:nvPr/>
         </p:nvPicPr>
-        <p:blipFill rotWithShape="1">
+        <p:blipFill>
           <a:blip r:embed="rId5">
             <a:extLst>
               <a:ext uri="{28A0092B-C50C-407E-A947-70E740481C1C}">
@@ -13698,12 +13868,12 @@
               </a:ext>
             </a:extLst>
           </a:blip>
-          <a:srcRect l="10050" t="2827" r="8350" b="5164"/>
+          <a:srcRect l="6070" r="6070"/>
           <a:stretch/>
         </p:blipFill>
         <p:spPr>
           <a:xfrm>
-            <a:off x="4443983" y="1636776"/>
+            <a:off x="4238155" y="1837264"/>
             <a:ext cx="7405913" cy="4198456"/>
           </a:xfrm>
           <a:prstGeom prst="rect">
@@ -15089,7 +15259,7 @@
       </p:sp>
       <p:pic>
         <p:nvPicPr>
-          <p:cNvPr id="7" name="Immagine 6" descr="Immagine che contiene testo, linea, diagramma, Diagramma&#10;&#10;Descrizione generata automaticamente">
+          <p:cNvPr id="7" name="Immagine 6">
             <a:extLst>
               <a:ext uri="{FF2B5EF4-FFF2-40B4-BE49-F238E27FC236}">
                 <a16:creationId xmlns:a16="http://schemas.microsoft.com/office/drawing/2014/main" id="{04113D26-4C07-45F1-3539-13C491BD87DC}"/>
@@ -15101,7 +15271,7 @@
           </p:cNvPicPr>
           <p:nvPr/>
         </p:nvPicPr>
-        <p:blipFill rotWithShape="1">
+        <p:blipFill>
           <a:blip r:embed="rId3">
             <a:extLst>
               <a:ext uri="{28A0092B-C50C-407E-A947-70E740481C1C}">
@@ -15109,7 +15279,7 @@
               </a:ext>
             </a:extLst>
           </a:blip>
-          <a:srcRect l="9375" t="5165" r="8614" b="5165"/>
+          <a:srcRect l="7032" r="7032"/>
           <a:stretch/>
         </p:blipFill>
         <p:spPr>
@@ -15124,7 +15294,7 @@
       </p:pic>
       <p:pic>
         <p:nvPicPr>
-          <p:cNvPr id="11" name="Immagine 10" descr="Immagine che contiene testo, diagramma, Piano, schematico&#10;&#10;Descrizione generata automaticamente">
+          <p:cNvPr id="11" name="Immagine 10">
             <a:extLst>
               <a:ext uri="{FF2B5EF4-FFF2-40B4-BE49-F238E27FC236}">
                 <a16:creationId xmlns:a16="http://schemas.microsoft.com/office/drawing/2014/main" id="{3CDDFC4A-854D-ECD8-F3F2-F0E133646684}"/>
@@ -15136,7 +15306,7 @@
           </p:cNvPicPr>
           <p:nvPr/>
         </p:nvPicPr>
-        <p:blipFill rotWithShape="1">
+        <p:blipFill>
           <a:blip r:embed="rId4">
             <a:extLst>
               <a:ext uri="{28A0092B-C50C-407E-A947-70E740481C1C}">
@@ -15144,12 +15314,12 @@
               </a:ext>
             </a:extLst>
           </a:blip>
-          <a:srcRect l="10200" t="3119" r="8276" b="5165"/>
+          <a:srcRect l="8655" r="8655"/>
           <a:stretch/>
         </p:blipFill>
         <p:spPr>
           <a:xfrm>
-            <a:off x="4443983" y="1636776"/>
+            <a:off x="4443984" y="1636776"/>
             <a:ext cx="7405913" cy="4599432"/>
           </a:xfrm>
           <a:prstGeom prst="rect">
@@ -16419,13 +16589,8 @@
               <a:rPr lang="en-US" sz="1600" dirty="0">
                 <a:latin typeface="+mj-lt"/>
               </a:rPr>
-              <a:t>Presence of a little peak between 30 and 40 Hz, as expected from pathological spectrums</a:t>
-            </a:r>
-          </a:p>
-          <a:p>
-            <a:pPr marL="0" indent="0">
-              <a:buNone/>
-            </a:pPr>
+              <a:t>Presence of peaks above 30 Hz, an aspect that can be traced back to the pathology</a:t>
+            </a:r>
             <a:endParaRPr lang="en-US" sz="1600" b="1" dirty="0">
               <a:latin typeface="+mj-lt"/>
             </a:endParaRPr>
@@ -16434,7 +16599,7 @@
       </p:sp>
       <p:pic>
         <p:nvPicPr>
-          <p:cNvPr id="9" name="Immagine 8" descr="Immagine che contiene diagramma, testo, Piano, mappa&#10;&#10;Descrizione generata automaticamente">
+          <p:cNvPr id="9" name="Immagine 8">
             <a:extLst>
               <a:ext uri="{FF2B5EF4-FFF2-40B4-BE49-F238E27FC236}">
                 <a16:creationId xmlns:a16="http://schemas.microsoft.com/office/drawing/2014/main" id="{7280338B-9FC8-F270-F4EF-FF1ED6ABF7BE}"/>
@@ -16446,7 +16611,7 @@
           </p:cNvPicPr>
           <p:nvPr/>
         </p:nvPicPr>
-        <p:blipFill rotWithShape="1">
+        <p:blipFill>
           <a:blip r:embed="rId3">
             <a:extLst>
               <a:ext uri="{28A0092B-C50C-407E-A947-70E740481C1C}">
@@ -16454,7 +16619,7 @@
               </a:ext>
             </a:extLst>
           </a:blip>
-          <a:srcRect l="9450" t="3558" r="7901" b="4288"/>
+          <a:srcRect l="9593" r="9593"/>
           <a:stretch/>
         </p:blipFill>
         <p:spPr>
@@ -16469,7 +16634,7 @@
       </p:pic>
       <p:pic>
         <p:nvPicPr>
-          <p:cNvPr id="12" name="Immagine 11" descr="Immagine che contiene testo, diagramma, Piano&#10;&#10;Descrizione generata automaticamente">
+          <p:cNvPr id="12" name="Immagine 11">
             <a:extLst>
               <a:ext uri="{FF2B5EF4-FFF2-40B4-BE49-F238E27FC236}">
                 <a16:creationId xmlns:a16="http://schemas.microsoft.com/office/drawing/2014/main" id="{D57FA9A0-BD9F-38A7-665B-6E5E9426A719}"/>
@@ -16481,7 +16646,7 @@
           </p:cNvPicPr>
           <p:nvPr/>
         </p:nvPicPr>
-        <p:blipFill rotWithShape="1">
+        <p:blipFill>
           <a:blip r:embed="rId4">
             <a:extLst>
               <a:ext uri="{28A0092B-C50C-407E-A947-70E740481C1C}">
@@ -16489,7 +16654,7 @@
               </a:ext>
             </a:extLst>
           </a:blip>
-          <a:srcRect l="9600" t="3558" r="8425" b="4288"/>
+          <a:srcRect l="9593" r="9593"/>
           <a:stretch/>
         </p:blipFill>
         <p:spPr>
@@ -16929,8 +17094,8 @@
           </a:p>
         </p:txBody>
       </p:sp>
-      <mc:AlternateContent xmlns:mc="http://schemas.openxmlformats.org/markup-compatibility/2006" xmlns:a14="http://schemas.microsoft.com/office/drawing/2010/main">
-        <mc:Choice Requires="a14">
+      <mc:AlternateContent xmlns:mc="http://schemas.openxmlformats.org/markup-compatibility/2006">
+        <mc:Choice xmlns:a14="http://schemas.microsoft.com/office/drawing/2010/main" Requires="a14">
           <p:sp>
             <p:nvSpPr>
               <p:cNvPr id="6" name="Rectangle 2">
@@ -16949,8 +17114,8 @@
             </p:nvSpPr>
             <p:spPr bwMode="auto">
               <a:xfrm>
-                <a:off x="560197" y="1445085"/>
-                <a:ext cx="11281283" cy="4689554"/>
+                <a:off x="560197" y="1445278"/>
+                <a:ext cx="11281283" cy="4689169"/>
               </a:xfrm>
               <a:prstGeom prst="rect">
                 <a:avLst/>
@@ -17545,9 +17710,11 @@
                 </a:r>
                 <a:r>
                   <a:rPr lang="en-GB" altLang="it-IT" sz="1400" dirty="0"/>
-                  <a:t> as seen in the examples, when the model order is odd, there is a peak at 0 Hz which is not expected. The reason probably can be found into the number of coefficients of the AR model. In fact, evaluating the transfer function of an AR model in 0 Hz means:</a:t>
+                  <a:t> as seen in the examples, when the model order is odd, there is a peak at 0 Hz which is not expected. The reason probably can be found into the number of coefficients of the AR model. In fact, recalling the transfer function of a generic AR model: </a:t>
                 </a:r>
-                <a:endParaRPr lang="en-US" altLang="it-IT" sz="1400" dirty="0"/>
+                <a:endParaRPr lang="it-IT" altLang="it-IT" sz="1400" b="0" i="1" dirty="0">
+                  <a:latin typeface="Cambria Math" panose="02040503050406030204" pitchFamily="18" charset="0"/>
+                </a:endParaRPr>
               </a:p>
               <a:p>
                 <a:pPr marL="0" indent="0" eaLnBrk="0" fontAlgn="base" hangingPunct="0">
@@ -17591,50 +17758,6 @@
                           </m:r>
                         </m:e>
                       </m:d>
-                      <m:sSub>
-                        <m:sSubPr>
-                          <m:ctrlPr>
-                            <a:rPr lang="it-IT" altLang="it-IT" sz="1400" b="0" i="1" smtClean="0">
-                              <a:latin typeface="Cambria Math" panose="02040503050406030204" pitchFamily="18" charset="0"/>
-                            </a:rPr>
-                          </m:ctrlPr>
-                        </m:sSubPr>
-                        <m:e>
-                          <m:d>
-                            <m:dPr>
-                              <m:begChr m:val=""/>
-                              <m:endChr m:val="|"/>
-                              <m:ctrlPr>
-                                <a:rPr lang="it-IT" altLang="it-IT" sz="1400" b="0" i="1" smtClean="0">
-                                  <a:latin typeface="Cambria Math" panose="02040503050406030204" pitchFamily="18" charset="0"/>
-                                </a:rPr>
-                              </m:ctrlPr>
-                            </m:dPr>
-                            <m:e>
-                              <m:r>
-                                <a:rPr lang="it-IT" sz="2400">
-                                  <a:latin typeface="Cambria Math" panose="02040503050406030204" pitchFamily="18" charset="0"/>
-                                </a:rPr>
-                                <m:t>​</m:t>
-                              </m:r>
-                            </m:e>
-                          </m:d>
-                        </m:e>
-                        <m:sub>
-                          <m:r>
-                            <a:rPr lang="it-IT" altLang="it-IT" sz="1400" b="0" i="1" smtClean="0">
-                              <a:latin typeface="Cambria Math" panose="02040503050406030204" pitchFamily="18" charset="0"/>
-                            </a:rPr>
-                            <m:t>𝑧</m:t>
-                          </m:r>
-                          <m:r>
-                            <a:rPr lang="it-IT" altLang="it-IT" sz="1400" b="0" i="1" smtClean="0">
-                              <a:latin typeface="Cambria Math" panose="02040503050406030204" pitchFamily="18" charset="0"/>
-                            </a:rPr>
-                            <m:t>=0</m:t>
-                          </m:r>
-                        </m:sub>
-                      </m:sSub>
                       <m:r>
                         <a:rPr lang="it-IT" altLang="it-IT" sz="1400" b="0" i="1" smtClean="0">
                           <a:latin typeface="Cambria Math" panose="02040503050406030204" pitchFamily="18" charset="0"/>
@@ -17684,7 +17807,7 @@
                                 <a:rPr lang="it-IT" altLang="it-IT" sz="1400" b="0" i="1" smtClean="0">
                                   <a:latin typeface="Cambria Math" panose="02040503050406030204" pitchFamily="18" charset="0"/>
                                 </a:rPr>
-                                <m:t>=0</m:t>
+                                <m:t>=1</m:t>
                               </m:r>
                             </m:sub>
                             <m:sup>
@@ -17756,140 +17879,6 @@
                           </m:nary>
                         </m:den>
                       </m:f>
-                      <m:sSub>
-                        <m:sSubPr>
-                          <m:ctrlPr>
-                            <a:rPr lang="it-IT" altLang="it-IT" sz="1400" b="0" i="1" smtClean="0">
-                              <a:latin typeface="Cambria Math" panose="02040503050406030204" pitchFamily="18" charset="0"/>
-                            </a:rPr>
-                          </m:ctrlPr>
-                        </m:sSubPr>
-                        <m:e>
-                          <m:d>
-                            <m:dPr>
-                              <m:begChr m:val=""/>
-                              <m:endChr m:val="|"/>
-                              <m:ctrlPr>
-                                <a:rPr lang="it-IT" altLang="it-IT" sz="1400" b="0" i="1" smtClean="0">
-                                  <a:latin typeface="Cambria Math" panose="02040503050406030204" pitchFamily="18" charset="0"/>
-                                </a:rPr>
-                              </m:ctrlPr>
-                            </m:dPr>
-                            <m:e>
-                              <m:r>
-                                <a:rPr lang="it-IT" sz="2400">
-                                  <a:latin typeface="Cambria Math" panose="02040503050406030204" pitchFamily="18" charset="0"/>
-                                </a:rPr>
-                                <m:t>​</m:t>
-                              </m:r>
-                            </m:e>
-                          </m:d>
-                        </m:e>
-                        <m:sub>
-                          <m:r>
-                            <a:rPr lang="it-IT" altLang="it-IT" sz="1400" b="0" i="1" smtClean="0">
-                              <a:latin typeface="Cambria Math" panose="02040503050406030204" pitchFamily="18" charset="0"/>
-                            </a:rPr>
-                            <m:t>𝑧</m:t>
-                          </m:r>
-                          <m:r>
-                            <a:rPr lang="it-IT" altLang="it-IT" sz="1400" b="0" i="1" smtClean="0">
-                              <a:latin typeface="Cambria Math" panose="02040503050406030204" pitchFamily="18" charset="0"/>
-                            </a:rPr>
-                            <m:t>=0 </m:t>
-                          </m:r>
-                        </m:sub>
-                      </m:sSub>
-                      <m:r>
-                        <a:rPr lang="it-IT" altLang="it-IT" sz="1400" b="0" i="1" smtClean="0">
-                          <a:latin typeface="Cambria Math" panose="02040503050406030204" pitchFamily="18" charset="0"/>
-                        </a:rPr>
-                        <m:t>=</m:t>
-                      </m:r>
-                      <m:f>
-                        <m:fPr>
-                          <m:ctrlPr>
-                            <a:rPr lang="it-IT" altLang="it-IT" sz="1400" i="1">
-                              <a:latin typeface="Cambria Math" panose="02040503050406030204" pitchFamily="18" charset="0"/>
-                            </a:rPr>
-                          </m:ctrlPr>
-                        </m:fPr>
-                        <m:num>
-                          <m:r>
-                            <a:rPr lang="it-IT" altLang="it-IT" sz="1400" i="1">
-                              <a:latin typeface="Cambria Math" panose="02040503050406030204" pitchFamily="18" charset="0"/>
-                            </a:rPr>
-                            <m:t>1</m:t>
-                          </m:r>
-                        </m:num>
-                        <m:den>
-                          <m:r>
-                            <a:rPr lang="it-IT" altLang="it-IT" sz="1400" i="1">
-                              <a:latin typeface="Cambria Math" panose="02040503050406030204" pitchFamily="18" charset="0"/>
-                            </a:rPr>
-                            <m:t>1+</m:t>
-                          </m:r>
-                          <m:nary>
-                            <m:naryPr>
-                              <m:chr m:val="∑"/>
-                              <m:ctrlPr>
-                                <a:rPr lang="it-IT" altLang="it-IT" sz="1400" i="1">
-                                  <a:latin typeface="Cambria Math" panose="02040503050406030204" pitchFamily="18" charset="0"/>
-                                </a:rPr>
-                              </m:ctrlPr>
-                            </m:naryPr>
-                            <m:sub>
-                              <m:r>
-                                <a:rPr lang="it-IT" altLang="it-IT" sz="1400" i="1">
-                                  <a:latin typeface="Cambria Math" panose="02040503050406030204" pitchFamily="18" charset="0"/>
-                                </a:rPr>
-                                <m:t>𝑘</m:t>
-                              </m:r>
-                              <m:r>
-                                <a:rPr lang="it-IT" altLang="it-IT" sz="1400" i="1">
-                                  <a:latin typeface="Cambria Math" panose="02040503050406030204" pitchFamily="18" charset="0"/>
-                                </a:rPr>
-                                <m:t>=0</m:t>
-                              </m:r>
-                            </m:sub>
-                            <m:sup>
-                              <m:r>
-                                <a:rPr lang="it-IT" altLang="it-IT" sz="1400" i="1">
-                                  <a:latin typeface="Cambria Math" panose="02040503050406030204" pitchFamily="18" charset="0"/>
-                                </a:rPr>
-                                <m:t>𝑝</m:t>
-                              </m:r>
-                            </m:sup>
-                            <m:e>
-                              <m:sSub>
-                                <m:sSubPr>
-                                  <m:ctrlPr>
-                                    <a:rPr lang="it-IT" altLang="it-IT" sz="1400" i="1">
-                                      <a:latin typeface="Cambria Math" panose="02040503050406030204" pitchFamily="18" charset="0"/>
-                                    </a:rPr>
-                                  </m:ctrlPr>
-                                </m:sSubPr>
-                                <m:e>
-                                  <m:r>
-                                    <a:rPr lang="it-IT" altLang="it-IT" sz="1400" i="1">
-                                      <a:latin typeface="Cambria Math" panose="02040503050406030204" pitchFamily="18" charset="0"/>
-                                    </a:rPr>
-                                    <m:t>𝑎</m:t>
-                                  </m:r>
-                                </m:e>
-                                <m:sub>
-                                  <m:r>
-                                    <a:rPr lang="it-IT" altLang="it-IT" sz="1400" i="1">
-                                      <a:latin typeface="Cambria Math" panose="02040503050406030204" pitchFamily="18" charset="0"/>
-                                    </a:rPr>
-                                    <m:t>𝑘</m:t>
-                                  </m:r>
-                                </m:sub>
-                              </m:sSub>
-                            </m:e>
-                          </m:nary>
-                        </m:den>
-                      </m:f>
                     </m:oMath>
                   </m:oMathPara>
                 </a14:m>
@@ -17925,18 +17914,16 @@
                 </a:pPr>
                 <a:r>
                   <a:rPr lang="en-US" altLang="it-IT" sz="1400" dirty="0"/>
-                  <a:t>If the order  </a:t>
-                </a:r>
-                <a:r>
-                  <a:rPr lang="en-US" altLang="it-IT" sz="1400" i="1" dirty="0"/>
-                  <a:t>p</a:t>
-                </a:r>
-                <a:r>
-                  <a:rPr lang="en-US" altLang="it-IT" sz="1400" dirty="0"/>
-                  <a:t> is odd, the sum of the coefficients </a:t>
+                  <a:t>And, as known, such function can be studied looking at the denominator’s roots </a:t>
                 </a:r>
                 <a14:m>
                   <m:oMath xmlns:m="http://schemas.openxmlformats.org/officeDocument/2006/math">
+                    <m:r>
+                      <a:rPr lang="it-IT" altLang="it-IT" sz="1400" b="0" i="1" smtClean="0">
+                        <a:latin typeface="Cambria Math" panose="02040503050406030204" pitchFamily="18" charset="0"/>
+                      </a:rPr>
+                      <m:t>1+</m:t>
+                    </m:r>
                     <m:nary>
                       <m:naryPr>
                         <m:chr m:val="∑"/>
@@ -17957,7 +17944,7 @@
                           <a:rPr lang="it-IT" altLang="it-IT" sz="1400" b="0" i="1" smtClean="0">
                             <a:latin typeface="Cambria Math" panose="02040503050406030204" pitchFamily="18" charset="0"/>
                           </a:rPr>
-                          <m:t>=0</m:t>
+                          <m:t>=1</m:t>
                         </m:r>
                       </m:sub>
                       <m:sup>
@@ -18027,20 +18014,87 @@
                         </m:sSup>
                       </m:e>
                     </m:nary>
+                    <m:r>
+                      <a:rPr lang="it-IT" altLang="it-IT" sz="1400" b="0" i="1" smtClean="0">
+                        <a:latin typeface="Cambria Math" panose="02040503050406030204" pitchFamily="18" charset="0"/>
+                      </a:rPr>
+                      <m:t>=0</m:t>
+                    </m:r>
                   </m:oMath>
                 </a14:m>
                 <a:r>
                   <a:rPr lang="en-US" altLang="it-IT" sz="1400" dirty="0"/>
-                  <a:t> could result in a value such that it is very close to zero, generating a peak in the spectrum at 0 Hz (i.e., a DC peak). On the other hand, if </a:t>
+                  <a:t> which are, in general, real or in </a:t>
                 </a:r>
                 <a:r>
                   <a:rPr lang="en-US" altLang="it-IT" sz="1400" i="1" dirty="0"/>
-                  <a:t>p</a:t>
+                  <a:t>complex conjugate pairs</a:t>
                 </a:r>
                 <a:r>
                   <a:rPr lang="en-US" altLang="it-IT" sz="1400" dirty="0"/>
-                  <a:t> is even, there is a greater chance that the sum of the coefficients will not approach zero, preventing the formation of a peak at 0 Hz. </a:t>
+                  <a:t>. If the order </a:t>
                 </a:r>
+                <a:r>
+                  <a:rPr lang="en-US" altLang="it-IT" sz="1400" i="1" dirty="0"/>
+                  <a:t>p </a:t>
+                </a:r>
+                <a:r>
+                  <a:rPr lang="en-US" altLang="it-IT" sz="1400" dirty="0"/>
+                  <a:t>is odd, there’s the probability of a real root closer to </a:t>
+                </a:r>
+                <a:r>
+                  <a:rPr lang="en-US" altLang="it-IT" sz="1400" i="1" dirty="0"/>
+                  <a:t>z=1</a:t>
+                </a:r>
+                <a:r>
+                  <a:rPr lang="en-US" altLang="it-IT" sz="1400" dirty="0"/>
+                  <a:t>, leading to a peak in </a:t>
+                </a:r>
+                <a:r>
+                  <a:rPr lang="el-GR" altLang="it-IT" sz="1400" i="1" dirty="0"/>
+                  <a:t>ω</a:t>
+                </a:r>
+                <a:r>
+                  <a:rPr lang="it-IT" altLang="it-IT" sz="1400" i="1" dirty="0"/>
+                  <a:t>=0</a:t>
+                </a:r>
+                <a:r>
+                  <a:rPr lang="it-IT" altLang="it-IT" sz="1400" dirty="0"/>
+                  <a:t>. </a:t>
+                </a:r>
+                <a:r>
+                  <a:rPr lang="en-GB" altLang="it-IT" sz="1400" dirty="0"/>
+                  <a:t>Such possibility can be handled probably better if an </a:t>
+                </a:r>
+                <a:r>
+                  <a:rPr lang="en-GB" altLang="it-IT" sz="1400" i="1" dirty="0"/>
+                  <a:t>even</a:t>
+                </a:r>
+                <a:r>
+                  <a:rPr lang="en-GB" altLang="it-IT" sz="1400" dirty="0"/>
+                  <a:t> order is used, because the roots will be more symmetrical respect to the </a:t>
+                </a:r>
+                <a:r>
+                  <a:rPr lang="en-GB" altLang="it-IT" sz="1400" i="1" dirty="0"/>
+                  <a:t>Real</a:t>
+                </a:r>
+                <a:r>
+                  <a:rPr lang="en-GB" altLang="it-IT" sz="1400" dirty="0"/>
+                  <a:t> </a:t>
+                </a:r>
+                <a:r>
+                  <a:rPr lang="en-GB" altLang="it-IT" sz="1400" i="1" dirty="0"/>
+                  <a:t>Axis</a:t>
+                </a:r>
+                <a:r>
+                  <a:rPr lang="en-GB" altLang="it-IT" sz="1400" dirty="0"/>
+                  <a:t> of the unitary circle, leading to a less probably root in </a:t>
+                </a:r>
+                <a:r>
+                  <a:rPr lang="en-GB" altLang="it-IT" sz="1400" i="1" dirty="0"/>
+                  <a:t>z=1. </a:t>
+                </a:r>
+                <a:endParaRPr lang="en-GB" altLang="it-IT" sz="1400" dirty="0"/>
               </a:p>
               <a:p>
                 <a:pPr marL="0" indent="0" eaLnBrk="0" fontAlgn="base" hangingPunct="0">
@@ -18078,7 +18132,7 @@
             </p:txBody>
           </p:sp>
         </mc:Choice>
-        <mc:Fallback xmlns="">
+        <mc:Fallback>
           <p:sp>
             <p:nvSpPr>
               <p:cNvPr id="6" name="Rectangle 2">
@@ -18097,8 +18151,8 @@
             </p:nvSpPr>
             <p:spPr bwMode="auto">
               <a:xfrm>
-                <a:off x="560197" y="1445085"/>
-                <a:ext cx="11281283" cy="4689554"/>
+                <a:off x="560197" y="1445278"/>
+                <a:ext cx="11281283" cy="4689169"/>
               </a:xfrm>
               <a:prstGeom prst="rect">
                 <a:avLst/>
@@ -32401,12 +32455,47 @@
           </a:p>
         </p:txBody>
       </p:sp>
+      <p:pic>
+        <p:nvPicPr>
+          <p:cNvPr id="5" name="Immagine 4" descr="Immagine che contiene testo, linea, diagramma, Diagramma&#10;&#10;Descrizione generata automaticamente">
+            <a:extLst>
+              <a:ext uri="{FF2B5EF4-FFF2-40B4-BE49-F238E27FC236}">
+                <a16:creationId xmlns:a16="http://schemas.microsoft.com/office/drawing/2014/main" id="{9AF24EF7-E9DC-BC57-71A4-683C919292C3}"/>
+              </a:ext>
+            </a:extLst>
+          </p:cNvPr>
+          <p:cNvPicPr>
+            <a:picLocks noChangeAspect="1"/>
+          </p:cNvPicPr>
+          <p:nvPr/>
+        </p:nvPicPr>
+        <p:blipFill rotWithShape="1">
+          <a:blip r:embed="rId3">
+            <a:extLst>
+              <a:ext uri="{28A0092B-C50C-407E-A947-70E740481C1C}">
+                <a14:useLocalDpi xmlns:a14="http://schemas.microsoft.com/office/drawing/2010/main" val="0"/>
+              </a:ext>
+            </a:extLst>
+          </a:blip>
+          <a:srcRect l="9774" t="4610" r="8287" b="4610"/>
+          <a:stretch/>
+        </p:blipFill>
+        <p:spPr>
+          <a:xfrm>
+            <a:off x="543126" y="3443847"/>
+            <a:ext cx="5181017" cy="2827079"/>
+          </a:xfrm>
+          <a:prstGeom prst="rect">
+            <a:avLst/>
+          </a:prstGeom>
+        </p:spPr>
+      </p:pic>
       <p:grpSp>
         <p:nvGrpSpPr>
-          <p:cNvPr id="71" name="Gruppo 70">
+          <p:cNvPr id="3" name="Gruppo 2">
             <a:extLst>
               <a:ext uri="{FF2B5EF4-FFF2-40B4-BE49-F238E27FC236}">
-                <a16:creationId xmlns:a16="http://schemas.microsoft.com/office/drawing/2014/main" id="{DEA941D5-941D-9582-B553-DB0E2DE06BD0}"/>
+                <a16:creationId xmlns:a16="http://schemas.microsoft.com/office/drawing/2014/main" id="{EB1350F0-9876-F27F-20EF-766A0873DE99}"/>
               </a:ext>
             </a:extLst>
           </p:cNvPr>
@@ -32417,16 +32506,1126 @@
           <a:xfrm>
             <a:off x="6058663" y="1432423"/>
             <a:ext cx="5971031" cy="4838504"/>
-            <a:chOff x="5980177" y="1470857"/>
+            <a:chOff x="6058663" y="1432423"/>
             <a:chExt cx="5971031" cy="4838504"/>
           </a:xfrm>
         </p:grpSpPr>
+        <p:grpSp>
+          <p:nvGrpSpPr>
+            <p:cNvPr id="71" name="Gruppo 70">
+              <a:extLst>
+                <a:ext uri="{FF2B5EF4-FFF2-40B4-BE49-F238E27FC236}">
+                  <a16:creationId xmlns:a16="http://schemas.microsoft.com/office/drawing/2014/main" id="{DEA941D5-941D-9582-B553-DB0E2DE06BD0}"/>
+                </a:ext>
+              </a:extLst>
+            </p:cNvPr>
+            <p:cNvGrpSpPr/>
+            <p:nvPr/>
+          </p:nvGrpSpPr>
+          <p:grpSpPr>
+            <a:xfrm>
+              <a:off x="6058663" y="1432423"/>
+              <a:ext cx="5971031" cy="4838504"/>
+              <a:chOff x="5980177" y="1470857"/>
+              <a:chExt cx="5971031" cy="4838504"/>
+            </a:xfrm>
+          </p:grpSpPr>
+          <p:sp>
+            <p:nvSpPr>
+              <p:cNvPr id="23" name="Rettangolo con angoli arrotondati 22">
+                <a:extLst>
+                  <a:ext uri="{FF2B5EF4-FFF2-40B4-BE49-F238E27FC236}">
+                    <a16:creationId xmlns:a16="http://schemas.microsoft.com/office/drawing/2014/main" id="{A4D96B35-6E4E-2DD5-3A8A-955BEAEE9903}"/>
+                  </a:ext>
+                </a:extLst>
+              </p:cNvPr>
+              <p:cNvSpPr/>
+              <p:nvPr/>
+            </p:nvSpPr>
+            <p:spPr>
+              <a:xfrm>
+                <a:off x="6095999" y="1470857"/>
+                <a:ext cx="2005586" cy="304937"/>
+              </a:xfrm>
+              <a:prstGeom prst="roundRect">
+                <a:avLst/>
+              </a:prstGeom>
+            </p:spPr>
+            <p:style>
+              <a:lnRef idx="3">
+                <a:schemeClr val="lt1"/>
+              </a:lnRef>
+              <a:fillRef idx="1">
+                <a:schemeClr val="accent3"/>
+              </a:fillRef>
+              <a:effectRef idx="1">
+                <a:schemeClr val="accent3"/>
+              </a:effectRef>
+              <a:fontRef idx="minor">
+                <a:schemeClr val="lt1"/>
+              </a:fontRef>
+            </p:style>
+            <p:txBody>
+              <a:bodyPr rtlCol="0" anchor="ctr"/>
+              <a:lstStyle/>
+              <a:p>
+                <a:pPr algn="ctr"/>
+                <a:r>
+                  <a:rPr lang="en-GB" sz="1600" dirty="0"/>
+                  <a:t>Original signal</a:t>
+                </a:r>
+              </a:p>
+            </p:txBody>
+          </p:sp>
+          <p:sp>
+            <p:nvSpPr>
+              <p:cNvPr id="24" name="Rettangolo con angoli arrotondati 23">
+                <a:extLst>
+                  <a:ext uri="{FF2B5EF4-FFF2-40B4-BE49-F238E27FC236}">
+                    <a16:creationId xmlns:a16="http://schemas.microsoft.com/office/drawing/2014/main" id="{8C312E0C-E122-DC18-A3D8-DC567EFF0D02}"/>
+                  </a:ext>
+                </a:extLst>
+              </p:cNvPr>
+              <p:cNvSpPr/>
+              <p:nvPr/>
+            </p:nvSpPr>
+            <p:spPr>
+              <a:xfrm>
+                <a:off x="6095999" y="2661612"/>
+                <a:ext cx="2005586" cy="304937"/>
+              </a:xfrm>
+              <a:prstGeom prst="roundRect">
+                <a:avLst/>
+              </a:prstGeom>
+              <a:solidFill>
+                <a:schemeClr val="accent6">
+                  <a:lumMod val="60000"/>
+                  <a:lumOff val="40000"/>
+                </a:schemeClr>
+              </a:solidFill>
+            </p:spPr>
+            <p:style>
+              <a:lnRef idx="3">
+                <a:schemeClr val="lt1"/>
+              </a:lnRef>
+              <a:fillRef idx="1">
+                <a:schemeClr val="accent3"/>
+              </a:fillRef>
+              <a:effectRef idx="1">
+                <a:schemeClr val="accent3"/>
+              </a:effectRef>
+              <a:fontRef idx="minor">
+                <a:schemeClr val="lt1"/>
+              </a:fontRef>
+            </p:style>
+            <p:txBody>
+              <a:bodyPr rtlCol="0" anchor="ctr"/>
+              <a:lstStyle/>
+              <a:p>
+                <a:pPr algn="ctr"/>
+                <a:r>
+                  <a:rPr lang="en-GB" sz="1600" dirty="0"/>
+                  <a:t>DWT decomposition</a:t>
+                </a:r>
+              </a:p>
+            </p:txBody>
+          </p:sp>
+          <p:sp>
+            <p:nvSpPr>
+              <p:cNvPr id="25" name="Rettangolo con angoli arrotondati 24">
+                <a:extLst>
+                  <a:ext uri="{FF2B5EF4-FFF2-40B4-BE49-F238E27FC236}">
+                    <a16:creationId xmlns:a16="http://schemas.microsoft.com/office/drawing/2014/main" id="{B84530B7-8C48-A164-A57E-FB3D809B55B5}"/>
+                  </a:ext>
+                </a:extLst>
+              </p:cNvPr>
+              <p:cNvSpPr/>
+              <p:nvPr/>
+            </p:nvSpPr>
+            <p:spPr>
+              <a:xfrm>
+                <a:off x="6089903" y="3199873"/>
+                <a:ext cx="2011682" cy="571638"/>
+              </a:xfrm>
+              <a:prstGeom prst="roundRect">
+                <a:avLst/>
+              </a:prstGeom>
+              <a:solidFill>
+                <a:schemeClr val="accent6">
+                  <a:lumMod val="60000"/>
+                  <a:lumOff val="40000"/>
+                </a:schemeClr>
+              </a:solidFill>
+            </p:spPr>
+            <p:style>
+              <a:lnRef idx="3">
+                <a:schemeClr val="lt1"/>
+              </a:lnRef>
+              <a:fillRef idx="1">
+                <a:schemeClr val="accent3"/>
+              </a:fillRef>
+              <a:effectRef idx="1">
+                <a:schemeClr val="accent3"/>
+              </a:effectRef>
+              <a:fontRef idx="minor">
+                <a:schemeClr val="lt1"/>
+              </a:fontRef>
+            </p:style>
+            <p:txBody>
+              <a:bodyPr rtlCol="0" anchor="ctr"/>
+              <a:lstStyle/>
+              <a:p>
+                <a:pPr algn="ctr"/>
+                <a:r>
+                  <a:rPr lang="en-GB" sz="1600" dirty="0"/>
+                  <a:t>Donoho soft thresholding</a:t>
+                </a:r>
+              </a:p>
+            </p:txBody>
+          </p:sp>
+          <p:sp>
+            <p:nvSpPr>
+              <p:cNvPr id="27" name="Rettangolo con angoli arrotondati 26">
+                <a:extLst>
+                  <a:ext uri="{FF2B5EF4-FFF2-40B4-BE49-F238E27FC236}">
+                    <a16:creationId xmlns:a16="http://schemas.microsoft.com/office/drawing/2014/main" id="{20175CDB-5BAB-9A30-CB36-D58FD733ED4B}"/>
+                  </a:ext>
+                </a:extLst>
+              </p:cNvPr>
+              <p:cNvSpPr/>
+              <p:nvPr/>
+            </p:nvSpPr>
+            <p:spPr>
+              <a:xfrm>
+                <a:off x="6095999" y="2123351"/>
+                <a:ext cx="2005586" cy="304937"/>
+              </a:xfrm>
+              <a:prstGeom prst="roundRect">
+                <a:avLst/>
+              </a:prstGeom>
+              <a:solidFill>
+                <a:schemeClr val="accent5">
+                  <a:lumMod val="60000"/>
+                  <a:lumOff val="40000"/>
+                </a:schemeClr>
+              </a:solidFill>
+            </p:spPr>
+            <p:style>
+              <a:lnRef idx="3">
+                <a:schemeClr val="lt1"/>
+              </a:lnRef>
+              <a:fillRef idx="1">
+                <a:schemeClr val="accent3"/>
+              </a:fillRef>
+              <a:effectRef idx="1">
+                <a:schemeClr val="accent3"/>
+              </a:effectRef>
+              <a:fontRef idx="minor">
+                <a:schemeClr val="lt1"/>
+              </a:fontRef>
+            </p:style>
+            <p:txBody>
+              <a:bodyPr rtlCol="0" anchor="ctr"/>
+              <a:lstStyle/>
+              <a:p>
+                <a:pPr algn="ctr"/>
+                <a:r>
+                  <a:rPr lang="en-GB" sz="1600" dirty="0"/>
+                  <a:t>Symmetric padding</a:t>
+                </a:r>
+              </a:p>
+            </p:txBody>
+          </p:sp>
+          <p:sp>
+            <p:nvSpPr>
+              <p:cNvPr id="28" name="Rettangolo con angoli arrotondati 27">
+                <a:extLst>
+                  <a:ext uri="{FF2B5EF4-FFF2-40B4-BE49-F238E27FC236}">
+                    <a16:creationId xmlns:a16="http://schemas.microsoft.com/office/drawing/2014/main" id="{F3BC79E2-C758-E8AA-E225-173DD9E42BF2}"/>
+                  </a:ext>
+                </a:extLst>
+              </p:cNvPr>
+              <p:cNvSpPr/>
+              <p:nvPr/>
+            </p:nvSpPr>
+            <p:spPr>
+              <a:xfrm>
+                <a:off x="6089903" y="4004835"/>
+                <a:ext cx="2005586" cy="571638"/>
+              </a:xfrm>
+              <a:prstGeom prst="roundRect">
+                <a:avLst/>
+              </a:prstGeom>
+              <a:solidFill>
+                <a:schemeClr val="accent6">
+                  <a:lumMod val="60000"/>
+                  <a:lumOff val="40000"/>
+                </a:schemeClr>
+              </a:solidFill>
+            </p:spPr>
+            <p:style>
+              <a:lnRef idx="3">
+                <a:schemeClr val="lt1"/>
+              </a:lnRef>
+              <a:fillRef idx="1">
+                <a:schemeClr val="accent3"/>
+              </a:fillRef>
+              <a:effectRef idx="1">
+                <a:schemeClr val="accent3"/>
+              </a:effectRef>
+              <a:fontRef idx="minor">
+                <a:schemeClr val="lt1"/>
+              </a:fontRef>
+            </p:style>
+            <p:txBody>
+              <a:bodyPr rtlCol="0" anchor="ctr"/>
+              <a:lstStyle/>
+              <a:p>
+                <a:pPr algn="ctr"/>
+                <a:r>
+                  <a:rPr lang="en-GB" sz="1600" dirty="0"/>
+                  <a:t>De-padding and DWT reconstruction</a:t>
+                </a:r>
+              </a:p>
+            </p:txBody>
+          </p:sp>
+          <p:sp>
+            <p:nvSpPr>
+              <p:cNvPr id="29" name="Rettangolo con angoli arrotondati 28">
+                <a:extLst>
+                  <a:ext uri="{FF2B5EF4-FFF2-40B4-BE49-F238E27FC236}">
+                    <a16:creationId xmlns:a16="http://schemas.microsoft.com/office/drawing/2014/main" id="{992B7B0A-3052-3273-E0FF-2B5853D5A4B7}"/>
+                  </a:ext>
+                </a:extLst>
+              </p:cNvPr>
+              <p:cNvSpPr/>
+              <p:nvPr/>
+            </p:nvSpPr>
+            <p:spPr>
+              <a:xfrm>
+                <a:off x="6095999" y="4794247"/>
+                <a:ext cx="2005586" cy="571638"/>
+              </a:xfrm>
+              <a:prstGeom prst="roundRect">
+                <a:avLst/>
+              </a:prstGeom>
+              <a:solidFill>
+                <a:schemeClr val="tx2">
+                  <a:lumMod val="60000"/>
+                  <a:lumOff val="40000"/>
+                </a:schemeClr>
+              </a:solidFill>
+            </p:spPr>
+            <p:style>
+              <a:lnRef idx="3">
+                <a:schemeClr val="lt1"/>
+              </a:lnRef>
+              <a:fillRef idx="1">
+                <a:schemeClr val="accent3"/>
+              </a:fillRef>
+              <a:effectRef idx="1">
+                <a:schemeClr val="accent3"/>
+              </a:effectRef>
+              <a:fontRef idx="minor">
+                <a:schemeClr val="lt1"/>
+              </a:fontRef>
+            </p:style>
+            <p:txBody>
+              <a:bodyPr rtlCol="0" anchor="ctr"/>
+              <a:lstStyle/>
+              <a:p>
+                <a:pPr algn="ctr"/>
+                <a:r>
+                  <a:rPr lang="en-GB" sz="1600" dirty="0"/>
+                  <a:t>Butterworth HP filter </a:t>
+                </a:r>
+                <a:r>
+                  <a:rPr lang="en-GB" sz="1100" dirty="0"/>
+                  <a:t>(order 6, cutoff at 0.5 Hz)</a:t>
+                </a:r>
+                <a:endParaRPr lang="en-GB" sz="1600" dirty="0"/>
+              </a:p>
+            </p:txBody>
+          </p:sp>
+          <p:sp>
+            <p:nvSpPr>
+              <p:cNvPr id="30" name="Rettangolo con angoli arrotondati 29">
+                <a:extLst>
+                  <a:ext uri="{FF2B5EF4-FFF2-40B4-BE49-F238E27FC236}">
+                    <a16:creationId xmlns:a16="http://schemas.microsoft.com/office/drawing/2014/main" id="{CB1C513A-C012-BC23-53A5-3931C09A8224}"/>
+                  </a:ext>
+                </a:extLst>
+              </p:cNvPr>
+              <p:cNvSpPr/>
+              <p:nvPr/>
+            </p:nvSpPr>
+            <p:spPr>
+              <a:xfrm>
+                <a:off x="6095999" y="5603312"/>
+                <a:ext cx="2005586" cy="571638"/>
+              </a:xfrm>
+              <a:prstGeom prst="roundRect">
+                <a:avLst/>
+              </a:prstGeom>
+              <a:solidFill>
+                <a:schemeClr val="tx2">
+                  <a:lumMod val="60000"/>
+                  <a:lumOff val="40000"/>
+                </a:schemeClr>
+              </a:solidFill>
+            </p:spPr>
+            <p:style>
+              <a:lnRef idx="3">
+                <a:schemeClr val="lt1"/>
+              </a:lnRef>
+              <a:fillRef idx="1">
+                <a:schemeClr val="accent3"/>
+              </a:fillRef>
+              <a:effectRef idx="1">
+                <a:schemeClr val="accent3"/>
+              </a:effectRef>
+              <a:fontRef idx="minor">
+                <a:schemeClr val="lt1"/>
+              </a:fontRef>
+            </p:style>
+            <p:txBody>
+              <a:bodyPr rtlCol="0" anchor="ctr"/>
+              <a:lstStyle/>
+              <a:p>
+                <a:pPr algn="ctr"/>
+                <a:r>
+                  <a:rPr lang="en-GB" sz="1600" dirty="0"/>
+                  <a:t>Butterworth LP filter </a:t>
+                </a:r>
+                <a:r>
+                  <a:rPr lang="en-GB" sz="1100" dirty="0"/>
+                  <a:t>(order 6, cutoff at 45 Hz)</a:t>
+                </a:r>
+                <a:endParaRPr lang="en-GB" sz="1600" dirty="0"/>
+              </a:p>
+            </p:txBody>
+          </p:sp>
+          <p:sp>
+            <p:nvSpPr>
+              <p:cNvPr id="31" name="Rettangolo con angoli arrotondati 30">
+                <a:extLst>
+                  <a:ext uri="{FF2B5EF4-FFF2-40B4-BE49-F238E27FC236}">
+                    <a16:creationId xmlns:a16="http://schemas.microsoft.com/office/drawing/2014/main" id="{93C9EB82-C465-94BF-BF8B-71F13A881C4E}"/>
+                  </a:ext>
+                </a:extLst>
+              </p:cNvPr>
+              <p:cNvSpPr/>
+              <p:nvPr/>
+            </p:nvSpPr>
+            <p:spPr>
+              <a:xfrm>
+                <a:off x="8311136" y="2143231"/>
+                <a:ext cx="2980944" cy="265176"/>
+              </a:xfrm>
+              <a:prstGeom prst="roundRect">
+                <a:avLst/>
+              </a:prstGeom>
+              <a:noFill/>
+              <a:ln w="9525" cap="flat" cmpd="sng" algn="ctr">
+                <a:solidFill>
+                  <a:schemeClr val="dk1"/>
+                </a:solidFill>
+                <a:prstDash val="solid"/>
+                <a:round/>
+                <a:headEnd type="none" w="med" len="med"/>
+                <a:tailEnd type="none" w="med" len="med"/>
+              </a:ln>
+            </p:spPr>
+            <p:style>
+              <a:lnRef idx="0">
+                <a:scrgbClr r="0" g="0" b="0"/>
+              </a:lnRef>
+              <a:fillRef idx="0">
+                <a:scrgbClr r="0" g="0" b="0"/>
+              </a:fillRef>
+              <a:effectRef idx="0">
+                <a:scrgbClr r="0" g="0" b="0"/>
+              </a:effectRef>
+              <a:fontRef idx="minor">
+                <a:schemeClr val="dk1"/>
+              </a:fontRef>
+            </p:style>
+            <p:txBody>
+              <a:bodyPr rtlCol="0" anchor="ctr"/>
+              <a:lstStyle/>
+              <a:p>
+                <a:pPr algn="ctr"/>
+                <a:r>
+                  <a:rPr lang="en-GB" sz="1050" dirty="0"/>
+                  <a:t>Improves the overall wavelet transformation </a:t>
+                </a:r>
+                <a:r>
+                  <a:rPr lang="en-GB" sz="1050" dirty="0">
+                    <a:solidFill>
+                      <a:schemeClr val="bg2">
+                        <a:lumMod val="75000"/>
+                      </a:schemeClr>
+                    </a:solidFill>
+                  </a:rPr>
+                  <a:t>[3] </a:t>
+                </a:r>
+              </a:p>
+            </p:txBody>
+          </p:sp>
+          <mc:AlternateContent xmlns:mc="http://schemas.openxmlformats.org/markup-compatibility/2006" xmlns:a14="http://schemas.microsoft.com/office/drawing/2010/main">
+            <mc:Choice Requires="a14">
+              <p:sp>
+                <p:nvSpPr>
+                  <p:cNvPr id="32" name="Rettangolo con angoli arrotondati 31">
+                    <a:extLst>
+                      <a:ext uri="{FF2B5EF4-FFF2-40B4-BE49-F238E27FC236}">
+                        <a16:creationId xmlns:a16="http://schemas.microsoft.com/office/drawing/2014/main" id="{44898CE4-3B97-0EBF-D8EE-65470AA7116D}"/>
+                      </a:ext>
+                    </a:extLst>
+                  </p:cNvPr>
+                  <p:cNvSpPr/>
+                  <p:nvPr/>
+                </p:nvSpPr>
+                <p:spPr>
+                  <a:xfrm>
+                    <a:off x="8311136" y="3196463"/>
+                    <a:ext cx="3493042" cy="571638"/>
+                  </a:xfrm>
+                  <a:prstGeom prst="roundRect">
+                    <a:avLst/>
+                  </a:prstGeom>
+                  <a:noFill/>
+                  <a:ln w="9525" cap="flat" cmpd="sng" algn="ctr">
+                    <a:solidFill>
+                      <a:schemeClr val="dk1"/>
+                    </a:solidFill>
+                    <a:prstDash val="solid"/>
+                    <a:round/>
+                    <a:headEnd type="none" w="med" len="med"/>
+                    <a:tailEnd type="none" w="med" len="med"/>
+                  </a:ln>
+                </p:spPr>
+                <p:style>
+                  <a:lnRef idx="0">
+                    <a:scrgbClr r="0" g="0" b="0"/>
+                  </a:lnRef>
+                  <a:fillRef idx="0">
+                    <a:scrgbClr r="0" g="0" b="0"/>
+                  </a:fillRef>
+                  <a:effectRef idx="0">
+                    <a:scrgbClr r="0" g="0" b="0"/>
+                  </a:effectRef>
+                  <a:fontRef idx="minor">
+                    <a:schemeClr val="dk1"/>
+                  </a:fontRef>
+                </p:style>
+                <p:txBody>
+                  <a:bodyPr rtlCol="0" anchor="ctr"/>
+                  <a:lstStyle/>
+                  <a:p>
+                    <a:pPr algn="ctr"/>
+                    <a:r>
+                      <a:rPr lang="en-GB" sz="1050" dirty="0"/>
+                      <a:t>Uses noise variance estimation to fix a threshold under which DWT coefficients are set to zero: </a:t>
+                    </a:r>
+                    <a14:m>
+                      <m:oMath xmlns:m="http://schemas.openxmlformats.org/officeDocument/2006/math">
+                        <m:r>
+                          <m:rPr>
+                            <m:sty m:val="p"/>
+                          </m:rPr>
+                          <a:rPr lang="it-IT" sz="1050" b="0" i="0" smtClean="0">
+                            <a:latin typeface="Cambria Math" panose="02040503050406030204" pitchFamily="18" charset="0"/>
+                          </a:rPr>
+                          <m:t>th</m:t>
+                        </m:r>
+                        <m:r>
+                          <a:rPr lang="it-IT" sz="1050" b="0" i="0" smtClean="0">
+                            <a:latin typeface="Cambria Math" panose="02040503050406030204" pitchFamily="18" charset="0"/>
+                          </a:rPr>
+                          <m:t>= </m:t>
+                        </m:r>
+                        <m:r>
+                          <a:rPr lang="it-IT" sz="1050" b="0" i="1" smtClean="0">
+                            <a:latin typeface="Cambria Math" panose="02040503050406030204" pitchFamily="18" charset="0"/>
+                          </a:rPr>
+                          <m:t>𝜎</m:t>
+                        </m:r>
+                        <m:rad>
+                          <m:radPr>
+                            <m:degHide m:val="on"/>
+                            <m:ctrlPr>
+                              <a:rPr lang="it-IT" sz="1050" b="0" i="1" smtClean="0">
+                                <a:latin typeface="Cambria Math" panose="02040503050406030204" pitchFamily="18" charset="0"/>
+                              </a:rPr>
+                            </m:ctrlPr>
+                          </m:radPr>
+                          <m:deg/>
+                          <m:e>
+                            <m:r>
+                              <a:rPr lang="it-IT" sz="1050" b="0" i="1" smtClean="0">
+                                <a:latin typeface="Cambria Math" panose="02040503050406030204" pitchFamily="18" charset="0"/>
+                              </a:rPr>
+                              <m:t>2</m:t>
+                            </m:r>
+                            <m:r>
+                              <m:rPr>
+                                <m:sty m:val="p"/>
+                              </m:rPr>
+                              <a:rPr lang="it-IT" sz="1050" b="0" i="0" smtClean="0">
+                                <a:latin typeface="Cambria Math" panose="02040503050406030204" pitchFamily="18" charset="0"/>
+                              </a:rPr>
+                              <m:t>log</m:t>
+                            </m:r>
+                            <m:r>
+                              <a:rPr lang="it-IT" sz="1050" b="0" i="1" smtClean="0">
+                                <a:latin typeface="Cambria Math" panose="02040503050406030204" pitchFamily="18" charset="0"/>
+                              </a:rPr>
+                              <m:t>⁡(</m:t>
+                            </m:r>
+                            <m:r>
+                              <a:rPr lang="it-IT" sz="1050" b="0" i="1" smtClean="0">
+                                <a:latin typeface="Cambria Math" panose="02040503050406030204" pitchFamily="18" charset="0"/>
+                              </a:rPr>
+                              <m:t>𝑀</m:t>
+                            </m:r>
+                            <m:r>
+                              <a:rPr lang="it-IT" sz="1050" b="0" i="1" smtClean="0">
+                                <a:latin typeface="Cambria Math" panose="02040503050406030204" pitchFamily="18" charset="0"/>
+                              </a:rPr>
+                              <m:t>)</m:t>
+                            </m:r>
+                          </m:e>
+                        </m:rad>
+                      </m:oMath>
+                    </a14:m>
+                    <a:r>
+                      <a:rPr lang="en-GB" sz="1050" dirty="0"/>
+                      <a:t> where M is the sample size </a:t>
+                    </a:r>
+                    <a:r>
+                      <a:rPr lang="en-GB" sz="1050" dirty="0">
+                        <a:solidFill>
+                          <a:schemeClr val="bg2">
+                            <a:lumMod val="75000"/>
+                          </a:schemeClr>
+                        </a:solidFill>
+                      </a:rPr>
+                      <a:t>[4] </a:t>
+                    </a:r>
+                  </a:p>
+                </p:txBody>
+              </p:sp>
+            </mc:Choice>
+            <mc:Fallback xmlns="">
+              <p:sp>
+                <p:nvSpPr>
+                  <p:cNvPr id="32" name="Rettangolo con angoli arrotondati 31">
+                    <a:extLst>
+                      <a:ext uri="{FF2B5EF4-FFF2-40B4-BE49-F238E27FC236}">
+                        <a16:creationId xmlns:a16="http://schemas.microsoft.com/office/drawing/2014/main" id="{44898CE4-3B97-0EBF-D8EE-65470AA7116D}"/>
+                      </a:ext>
+                    </a:extLst>
+                  </p:cNvPr>
+                  <p:cNvSpPr>
+                    <a:spLocks noRot="1" noChangeAspect="1" noMove="1" noResize="1" noEditPoints="1" noAdjustHandles="1" noChangeArrowheads="1" noChangeShapeType="1" noTextEdit="1"/>
+                  </p:cNvSpPr>
+                  <p:nvPr/>
+                </p:nvSpPr>
+                <p:spPr>
+                  <a:xfrm>
+                    <a:off x="8311136" y="3196463"/>
+                    <a:ext cx="3493042" cy="571638"/>
+                  </a:xfrm>
+                  <a:prstGeom prst="roundRect">
+                    <a:avLst/>
+                  </a:prstGeom>
+                  <a:blipFill>
+                    <a:blip r:embed="rId4"/>
+                    <a:stretch>
+                      <a:fillRect t="-1042" b="-8333"/>
+                    </a:stretch>
+                  </a:blipFill>
+                  <a:ln w="9525" cap="flat" cmpd="sng" algn="ctr">
+                    <a:solidFill>
+                      <a:schemeClr val="dk1"/>
+                    </a:solidFill>
+                    <a:prstDash val="solid"/>
+                    <a:round/>
+                    <a:headEnd type="none" w="med" len="med"/>
+                    <a:tailEnd type="none" w="med" len="med"/>
+                  </a:ln>
+                </p:spPr>
+                <p:txBody>
+                  <a:bodyPr/>
+                  <a:lstStyle/>
+                  <a:p>
+                    <a:r>
+                      <a:rPr lang="it-IT">
+                        <a:noFill/>
+                      </a:rPr>
+                      <a:t> </a:t>
+                    </a:r>
+                  </a:p>
+                </p:txBody>
+              </p:sp>
+            </mc:Fallback>
+          </mc:AlternateContent>
+          <p:sp>
+            <p:nvSpPr>
+              <p:cNvPr id="33" name="Rettangolo con angoli arrotondati 32">
+                <a:extLst>
+                  <a:ext uri="{FF2B5EF4-FFF2-40B4-BE49-F238E27FC236}">
+                    <a16:creationId xmlns:a16="http://schemas.microsoft.com/office/drawing/2014/main" id="{EFD88835-0A5E-4758-9CCD-BC563841D6C9}"/>
+                  </a:ext>
+                </a:extLst>
+              </p:cNvPr>
+              <p:cNvSpPr/>
+              <p:nvPr/>
+            </p:nvSpPr>
+            <p:spPr>
+              <a:xfrm>
+                <a:off x="8311136" y="4957430"/>
+                <a:ext cx="2080258" cy="245272"/>
+              </a:xfrm>
+              <a:prstGeom prst="roundRect">
+                <a:avLst/>
+              </a:prstGeom>
+              <a:noFill/>
+              <a:ln w="9525" cap="flat" cmpd="sng" algn="ctr">
+                <a:solidFill>
+                  <a:schemeClr val="dk1"/>
+                </a:solidFill>
+                <a:prstDash val="solid"/>
+                <a:round/>
+                <a:headEnd type="none" w="med" len="med"/>
+                <a:tailEnd type="none" w="med" len="med"/>
+              </a:ln>
+            </p:spPr>
+            <p:style>
+              <a:lnRef idx="0">
+                <a:scrgbClr r="0" g="0" b="0"/>
+              </a:lnRef>
+              <a:fillRef idx="0">
+                <a:scrgbClr r="0" g="0" b="0"/>
+              </a:fillRef>
+              <a:effectRef idx="0">
+                <a:scrgbClr r="0" g="0" b="0"/>
+              </a:effectRef>
+              <a:fontRef idx="minor">
+                <a:schemeClr val="dk1"/>
+              </a:fontRef>
+            </p:style>
+            <p:txBody>
+              <a:bodyPr rtlCol="0" anchor="ctr"/>
+              <a:lstStyle/>
+              <a:p>
+                <a:pPr algn="ctr"/>
+                <a:r>
+                  <a:rPr lang="en-GB" sz="1050" dirty="0"/>
+                  <a:t>Removes low frequency drift </a:t>
+                </a:r>
+                <a:r>
+                  <a:rPr lang="en-GB" sz="1050" dirty="0">
+                    <a:solidFill>
+                      <a:schemeClr val="bg2">
+                        <a:lumMod val="75000"/>
+                      </a:schemeClr>
+                    </a:solidFill>
+                  </a:rPr>
+                  <a:t>[2] </a:t>
+                </a:r>
+              </a:p>
+            </p:txBody>
+          </p:sp>
+          <p:sp>
+            <p:nvSpPr>
+              <p:cNvPr id="34" name="Rettangolo con angoli arrotondati 33">
+                <a:extLst>
+                  <a:ext uri="{FF2B5EF4-FFF2-40B4-BE49-F238E27FC236}">
+                    <a16:creationId xmlns:a16="http://schemas.microsoft.com/office/drawing/2014/main" id="{69C04314-41DE-2818-631F-F894D3301CDD}"/>
+                  </a:ext>
+                </a:extLst>
+              </p:cNvPr>
+              <p:cNvSpPr/>
+              <p:nvPr/>
+            </p:nvSpPr>
+            <p:spPr>
+              <a:xfrm>
+                <a:off x="8311136" y="5766495"/>
+                <a:ext cx="2610864" cy="245272"/>
+              </a:xfrm>
+              <a:prstGeom prst="roundRect">
+                <a:avLst/>
+              </a:prstGeom>
+              <a:noFill/>
+              <a:ln w="9525" cap="flat" cmpd="sng" algn="ctr">
+                <a:solidFill>
+                  <a:schemeClr val="dk1"/>
+                </a:solidFill>
+                <a:prstDash val="solid"/>
+                <a:round/>
+                <a:headEnd type="none" w="med" len="med"/>
+                <a:tailEnd type="none" w="med" len="med"/>
+              </a:ln>
+            </p:spPr>
+            <p:style>
+              <a:lnRef idx="0">
+                <a:scrgbClr r="0" g="0" b="0"/>
+              </a:lnRef>
+              <a:fillRef idx="0">
+                <a:scrgbClr r="0" g="0" b="0"/>
+              </a:fillRef>
+              <a:effectRef idx="0">
+                <a:scrgbClr r="0" g="0" b="0"/>
+              </a:effectRef>
+              <a:fontRef idx="minor">
+                <a:schemeClr val="dk1"/>
+              </a:fontRef>
+            </p:style>
+            <p:txBody>
+              <a:bodyPr rtlCol="0" anchor="ctr"/>
+              <a:lstStyle/>
+              <a:p>
+                <a:pPr algn="ctr"/>
+                <a:r>
+                  <a:rPr lang="en-GB" sz="1050" dirty="0"/>
+                  <a:t>Removes High frequency noise residuals </a:t>
+                </a:r>
+                <a:r>
+                  <a:rPr lang="en-GB" sz="1050" dirty="0">
+                    <a:solidFill>
+                      <a:schemeClr val="bg2">
+                        <a:lumMod val="75000"/>
+                      </a:schemeClr>
+                    </a:solidFill>
+                  </a:rPr>
+                  <a:t>[2] </a:t>
+                </a:r>
+              </a:p>
+            </p:txBody>
+          </p:sp>
+          <p:sp>
+            <p:nvSpPr>
+              <p:cNvPr id="35" name="Rettangolo con angoli arrotondati 34">
+                <a:extLst>
+                  <a:ext uri="{FF2B5EF4-FFF2-40B4-BE49-F238E27FC236}">
+                    <a16:creationId xmlns:a16="http://schemas.microsoft.com/office/drawing/2014/main" id="{374D58F7-54FC-9F21-5235-8EE790D41D94}"/>
+                  </a:ext>
+                </a:extLst>
+              </p:cNvPr>
+              <p:cNvSpPr/>
+              <p:nvPr/>
+            </p:nvSpPr>
+            <p:spPr>
+              <a:xfrm>
+                <a:off x="5980177" y="1984249"/>
+                <a:ext cx="5971031" cy="4325112"/>
+              </a:xfrm>
+              <a:prstGeom prst="roundRect">
+                <a:avLst>
+                  <a:gd name="adj" fmla="val 4447"/>
+                </a:avLst>
+              </a:prstGeom>
+              <a:noFill/>
+              <a:ln w="12700" cap="flat" cmpd="sng" algn="ctr">
+                <a:solidFill>
+                  <a:schemeClr val="dk1"/>
+                </a:solidFill>
+                <a:prstDash val="solid"/>
+                <a:round/>
+                <a:headEnd type="none" w="med" len="med"/>
+                <a:tailEnd type="none" w="med" len="med"/>
+              </a:ln>
+            </p:spPr>
+            <p:style>
+              <a:lnRef idx="0">
+                <a:scrgbClr r="0" g="0" b="0"/>
+              </a:lnRef>
+              <a:fillRef idx="0">
+                <a:scrgbClr r="0" g="0" b="0"/>
+              </a:fillRef>
+              <a:effectRef idx="0">
+                <a:scrgbClr r="0" g="0" b="0"/>
+              </a:effectRef>
+              <a:fontRef idx="minor">
+                <a:schemeClr val="dk1"/>
+              </a:fontRef>
+            </p:style>
+            <p:txBody>
+              <a:bodyPr rtlCol="0" anchor="ctr"/>
+              <a:lstStyle/>
+              <a:p>
+                <a:pPr algn="ctr"/>
+                <a:endParaRPr lang="it-IT" dirty="0"/>
+              </a:p>
+            </p:txBody>
+          </p:sp>
+          <p:cxnSp>
+            <p:nvCxnSpPr>
+              <p:cNvPr id="43" name="Connettore 2 42">
+                <a:extLst>
+                  <a:ext uri="{FF2B5EF4-FFF2-40B4-BE49-F238E27FC236}">
+                    <a16:creationId xmlns:a16="http://schemas.microsoft.com/office/drawing/2014/main" id="{84CCD13B-4DFB-B650-196B-6E8020D2B65D}"/>
+                  </a:ext>
+                </a:extLst>
+              </p:cNvPr>
+              <p:cNvCxnSpPr>
+                <a:cxnSpLocks/>
+                <a:stCxn id="23" idx="2"/>
+                <a:endCxn id="27" idx="0"/>
+              </p:cNvCxnSpPr>
+              <p:nvPr/>
+            </p:nvCxnSpPr>
+            <p:spPr>
+              <a:xfrm>
+                <a:off x="7098792" y="1775794"/>
+                <a:ext cx="0" cy="347557"/>
+              </a:xfrm>
+              <a:prstGeom prst="straightConnector1">
+                <a:avLst/>
+              </a:prstGeom>
+              <a:ln>
+                <a:tailEnd type="triangle"/>
+              </a:ln>
+            </p:spPr>
+            <p:style>
+              <a:lnRef idx="1">
+                <a:schemeClr val="dk1"/>
+              </a:lnRef>
+              <a:fillRef idx="0">
+                <a:schemeClr val="dk1"/>
+              </a:fillRef>
+              <a:effectRef idx="0">
+                <a:schemeClr val="dk1"/>
+              </a:effectRef>
+              <a:fontRef idx="minor">
+                <a:schemeClr val="tx1"/>
+              </a:fontRef>
+            </p:style>
+          </p:cxnSp>
+          <p:cxnSp>
+            <p:nvCxnSpPr>
+              <p:cNvPr id="45" name="Connettore 2 44">
+                <a:extLst>
+                  <a:ext uri="{FF2B5EF4-FFF2-40B4-BE49-F238E27FC236}">
+                    <a16:creationId xmlns:a16="http://schemas.microsoft.com/office/drawing/2014/main" id="{8A13818F-2046-6C1E-668C-F6B4CC3781EA}"/>
+                  </a:ext>
+                </a:extLst>
+              </p:cNvPr>
+              <p:cNvCxnSpPr>
+                <a:cxnSpLocks/>
+                <a:stCxn id="27" idx="2"/>
+                <a:endCxn id="24" idx="0"/>
+              </p:cNvCxnSpPr>
+              <p:nvPr/>
+            </p:nvCxnSpPr>
+            <p:spPr>
+              <a:xfrm>
+                <a:off x="7098792" y="2428288"/>
+                <a:ext cx="0" cy="233324"/>
+              </a:xfrm>
+              <a:prstGeom prst="straightConnector1">
+                <a:avLst/>
+              </a:prstGeom>
+              <a:ln>
+                <a:tailEnd type="triangle"/>
+              </a:ln>
+            </p:spPr>
+            <p:style>
+              <a:lnRef idx="1">
+                <a:schemeClr val="dk1"/>
+              </a:lnRef>
+              <a:fillRef idx="0">
+                <a:schemeClr val="dk1"/>
+              </a:fillRef>
+              <a:effectRef idx="0">
+                <a:schemeClr val="dk1"/>
+              </a:effectRef>
+              <a:fontRef idx="minor">
+                <a:schemeClr val="tx1"/>
+              </a:fontRef>
+            </p:style>
+          </p:cxnSp>
+          <p:cxnSp>
+            <p:nvCxnSpPr>
+              <p:cNvPr id="53" name="Connettore 2 52">
+                <a:extLst>
+                  <a:ext uri="{FF2B5EF4-FFF2-40B4-BE49-F238E27FC236}">
+                    <a16:creationId xmlns:a16="http://schemas.microsoft.com/office/drawing/2014/main" id="{C05978EC-9E8C-E143-8232-940CFF5EDE87}"/>
+                  </a:ext>
+                </a:extLst>
+              </p:cNvPr>
+              <p:cNvCxnSpPr>
+                <a:cxnSpLocks/>
+                <a:stCxn id="24" idx="2"/>
+                <a:endCxn id="25" idx="0"/>
+              </p:cNvCxnSpPr>
+              <p:nvPr/>
+            </p:nvCxnSpPr>
+            <p:spPr>
+              <a:xfrm flipH="1">
+                <a:off x="7095744" y="2966549"/>
+                <a:ext cx="3048" cy="233324"/>
+              </a:xfrm>
+              <a:prstGeom prst="straightConnector1">
+                <a:avLst/>
+              </a:prstGeom>
+              <a:ln>
+                <a:tailEnd type="triangle"/>
+              </a:ln>
+            </p:spPr>
+            <p:style>
+              <a:lnRef idx="1">
+                <a:schemeClr val="dk1"/>
+              </a:lnRef>
+              <a:fillRef idx="0">
+                <a:schemeClr val="dk1"/>
+              </a:fillRef>
+              <a:effectRef idx="0">
+                <a:schemeClr val="dk1"/>
+              </a:effectRef>
+              <a:fontRef idx="minor">
+                <a:schemeClr val="tx1"/>
+              </a:fontRef>
+            </p:style>
+          </p:cxnSp>
+          <p:cxnSp>
+            <p:nvCxnSpPr>
+              <p:cNvPr id="61" name="Connettore 2 60">
+                <a:extLst>
+                  <a:ext uri="{FF2B5EF4-FFF2-40B4-BE49-F238E27FC236}">
+                    <a16:creationId xmlns:a16="http://schemas.microsoft.com/office/drawing/2014/main" id="{C9EC1F32-FC92-A9C2-3334-1EE981EA4FC7}"/>
+                  </a:ext>
+                </a:extLst>
+              </p:cNvPr>
+              <p:cNvCxnSpPr>
+                <a:cxnSpLocks/>
+                <a:stCxn id="25" idx="2"/>
+                <a:endCxn id="28" idx="0"/>
+              </p:cNvCxnSpPr>
+              <p:nvPr/>
+            </p:nvCxnSpPr>
+            <p:spPr>
+              <a:xfrm flipH="1">
+                <a:off x="7092696" y="3771511"/>
+                <a:ext cx="3048" cy="233324"/>
+              </a:xfrm>
+              <a:prstGeom prst="straightConnector1">
+                <a:avLst/>
+              </a:prstGeom>
+              <a:ln>
+                <a:tailEnd type="triangle"/>
+              </a:ln>
+            </p:spPr>
+            <p:style>
+              <a:lnRef idx="1">
+                <a:schemeClr val="dk1"/>
+              </a:lnRef>
+              <a:fillRef idx="0">
+                <a:schemeClr val="dk1"/>
+              </a:fillRef>
+              <a:effectRef idx="0">
+                <a:schemeClr val="dk1"/>
+              </a:effectRef>
+              <a:fontRef idx="minor">
+                <a:schemeClr val="tx1"/>
+              </a:fontRef>
+            </p:style>
+          </p:cxnSp>
+          <p:cxnSp>
+            <p:nvCxnSpPr>
+              <p:cNvPr id="64" name="Connettore 2 63">
+                <a:extLst>
+                  <a:ext uri="{FF2B5EF4-FFF2-40B4-BE49-F238E27FC236}">
+                    <a16:creationId xmlns:a16="http://schemas.microsoft.com/office/drawing/2014/main" id="{24DFF073-1230-B9E2-81CC-04DC536B4600}"/>
+                  </a:ext>
+                </a:extLst>
+              </p:cNvPr>
+              <p:cNvCxnSpPr>
+                <a:cxnSpLocks/>
+                <a:stCxn id="28" idx="2"/>
+                <a:endCxn id="29" idx="0"/>
+              </p:cNvCxnSpPr>
+              <p:nvPr/>
+            </p:nvCxnSpPr>
+            <p:spPr>
+              <a:xfrm>
+                <a:off x="7092696" y="4576473"/>
+                <a:ext cx="6096" cy="217774"/>
+              </a:xfrm>
+              <a:prstGeom prst="straightConnector1">
+                <a:avLst/>
+              </a:prstGeom>
+              <a:ln>
+                <a:tailEnd type="triangle"/>
+              </a:ln>
+            </p:spPr>
+            <p:style>
+              <a:lnRef idx="1">
+                <a:schemeClr val="dk1"/>
+              </a:lnRef>
+              <a:fillRef idx="0">
+                <a:schemeClr val="dk1"/>
+              </a:fillRef>
+              <a:effectRef idx="0">
+                <a:schemeClr val="dk1"/>
+              </a:effectRef>
+              <a:fontRef idx="minor">
+                <a:schemeClr val="tx1"/>
+              </a:fontRef>
+            </p:style>
+          </p:cxnSp>
+          <p:cxnSp>
+            <p:nvCxnSpPr>
+              <p:cNvPr id="68" name="Connettore 2 67">
+                <a:extLst>
+                  <a:ext uri="{FF2B5EF4-FFF2-40B4-BE49-F238E27FC236}">
+                    <a16:creationId xmlns:a16="http://schemas.microsoft.com/office/drawing/2014/main" id="{8E802D19-9A41-B50C-1408-9C010EDDD599}"/>
+                  </a:ext>
+                </a:extLst>
+              </p:cNvPr>
+              <p:cNvCxnSpPr>
+                <a:cxnSpLocks/>
+                <a:stCxn id="29" idx="2"/>
+                <a:endCxn id="30" idx="0"/>
+              </p:cNvCxnSpPr>
+              <p:nvPr/>
+            </p:nvCxnSpPr>
+            <p:spPr>
+              <a:xfrm>
+                <a:off x="7098792" y="5365885"/>
+                <a:ext cx="0" cy="237427"/>
+              </a:xfrm>
+              <a:prstGeom prst="straightConnector1">
+                <a:avLst/>
+              </a:prstGeom>
+              <a:ln>
+                <a:tailEnd type="triangle"/>
+              </a:ln>
+            </p:spPr>
+            <p:style>
+              <a:lnRef idx="1">
+                <a:schemeClr val="dk1"/>
+              </a:lnRef>
+              <a:fillRef idx="0">
+                <a:schemeClr val="dk1"/>
+              </a:fillRef>
+              <a:effectRef idx="0">
+                <a:schemeClr val="dk1"/>
+              </a:effectRef>
+              <a:fontRef idx="minor">
+                <a:schemeClr val="tx1"/>
+              </a:fontRef>
+            </p:style>
+          </p:cxnSp>
+        </p:grpSp>
         <p:sp>
           <p:nvSpPr>
-            <p:cNvPr id="23" name="Rettangolo con angoli arrotondati 22">
+            <p:cNvPr id="7" name="Rettangolo con angoli arrotondati 6">
               <a:extLst>
                 <a:ext uri="{FF2B5EF4-FFF2-40B4-BE49-F238E27FC236}">
-                  <a16:creationId xmlns:a16="http://schemas.microsoft.com/office/drawing/2014/main" id="{A4D96B35-6E4E-2DD5-3A8A-955BEAEE9903}"/>
+                  <a16:creationId xmlns:a16="http://schemas.microsoft.com/office/drawing/2014/main" id="{8F2474CA-E4B8-4F85-C2CD-6D176BF11434}"/>
                 </a:ext>
               </a:extLst>
             </p:cNvPr>
@@ -32435,383 +33634,8 @@
           </p:nvSpPr>
           <p:spPr>
             <a:xfrm>
-              <a:off x="6095999" y="1470857"/>
-              <a:ext cx="2005586" cy="304937"/>
-            </a:xfrm>
-            <a:prstGeom prst="roundRect">
-              <a:avLst/>
-            </a:prstGeom>
-          </p:spPr>
-          <p:style>
-            <a:lnRef idx="3">
-              <a:schemeClr val="lt1"/>
-            </a:lnRef>
-            <a:fillRef idx="1">
-              <a:schemeClr val="accent3"/>
-            </a:fillRef>
-            <a:effectRef idx="1">
-              <a:schemeClr val="accent3"/>
-            </a:effectRef>
-            <a:fontRef idx="minor">
-              <a:schemeClr val="lt1"/>
-            </a:fontRef>
-          </p:style>
-          <p:txBody>
-            <a:bodyPr rtlCol="0" anchor="ctr"/>
-            <a:lstStyle/>
-            <a:p>
-              <a:pPr algn="ctr"/>
-              <a:r>
-                <a:rPr lang="en-GB" sz="1600" dirty="0"/>
-                <a:t>Original signal</a:t>
-              </a:r>
-            </a:p>
-          </p:txBody>
-        </p:sp>
-        <p:sp>
-          <p:nvSpPr>
-            <p:cNvPr id="24" name="Rettangolo con angoli arrotondati 23">
-              <a:extLst>
-                <a:ext uri="{FF2B5EF4-FFF2-40B4-BE49-F238E27FC236}">
-                  <a16:creationId xmlns:a16="http://schemas.microsoft.com/office/drawing/2014/main" id="{8C312E0C-E122-DC18-A3D8-DC567EFF0D02}"/>
-                </a:ext>
-              </a:extLst>
-            </p:cNvPr>
-            <p:cNvSpPr/>
-            <p:nvPr/>
-          </p:nvSpPr>
-          <p:spPr>
-            <a:xfrm>
-              <a:off x="6095999" y="2661612"/>
-              <a:ext cx="2005586" cy="304937"/>
-            </a:xfrm>
-            <a:prstGeom prst="roundRect">
-              <a:avLst/>
-            </a:prstGeom>
-            <a:solidFill>
-              <a:schemeClr val="accent6">
-                <a:lumMod val="60000"/>
-                <a:lumOff val="40000"/>
-              </a:schemeClr>
-            </a:solidFill>
-          </p:spPr>
-          <p:style>
-            <a:lnRef idx="3">
-              <a:schemeClr val="lt1"/>
-            </a:lnRef>
-            <a:fillRef idx="1">
-              <a:schemeClr val="accent3"/>
-            </a:fillRef>
-            <a:effectRef idx="1">
-              <a:schemeClr val="accent3"/>
-            </a:effectRef>
-            <a:fontRef idx="minor">
-              <a:schemeClr val="lt1"/>
-            </a:fontRef>
-          </p:style>
-          <p:txBody>
-            <a:bodyPr rtlCol="0" anchor="ctr"/>
-            <a:lstStyle/>
-            <a:p>
-              <a:pPr algn="ctr"/>
-              <a:r>
-                <a:rPr lang="en-GB" sz="1600" dirty="0"/>
-                <a:t>DWT decomposition</a:t>
-              </a:r>
-            </a:p>
-          </p:txBody>
-        </p:sp>
-        <p:sp>
-          <p:nvSpPr>
-            <p:cNvPr id="25" name="Rettangolo con angoli arrotondati 24">
-              <a:extLst>
-                <a:ext uri="{FF2B5EF4-FFF2-40B4-BE49-F238E27FC236}">
-                  <a16:creationId xmlns:a16="http://schemas.microsoft.com/office/drawing/2014/main" id="{B84530B7-8C48-A164-A57E-FB3D809B55B5}"/>
-                </a:ext>
-              </a:extLst>
-            </p:cNvPr>
-            <p:cNvSpPr/>
-            <p:nvPr/>
-          </p:nvSpPr>
-          <p:spPr>
-            <a:xfrm>
-              <a:off x="6089903" y="3199873"/>
-              <a:ext cx="2011682" cy="571638"/>
-            </a:xfrm>
-            <a:prstGeom prst="roundRect">
-              <a:avLst/>
-            </a:prstGeom>
-            <a:solidFill>
-              <a:schemeClr val="accent6">
-                <a:lumMod val="60000"/>
-                <a:lumOff val="40000"/>
-              </a:schemeClr>
-            </a:solidFill>
-          </p:spPr>
-          <p:style>
-            <a:lnRef idx="3">
-              <a:schemeClr val="lt1"/>
-            </a:lnRef>
-            <a:fillRef idx="1">
-              <a:schemeClr val="accent3"/>
-            </a:fillRef>
-            <a:effectRef idx="1">
-              <a:schemeClr val="accent3"/>
-            </a:effectRef>
-            <a:fontRef idx="minor">
-              <a:schemeClr val="lt1"/>
-            </a:fontRef>
-          </p:style>
-          <p:txBody>
-            <a:bodyPr rtlCol="0" anchor="ctr"/>
-            <a:lstStyle/>
-            <a:p>
-              <a:pPr algn="ctr"/>
-              <a:r>
-                <a:rPr lang="en-GB" sz="1600" dirty="0"/>
-                <a:t>Donoho soft thresholding</a:t>
-              </a:r>
-            </a:p>
-          </p:txBody>
-        </p:sp>
-        <p:sp>
-          <p:nvSpPr>
-            <p:cNvPr id="27" name="Rettangolo con angoli arrotondati 26">
-              <a:extLst>
-                <a:ext uri="{FF2B5EF4-FFF2-40B4-BE49-F238E27FC236}">
-                  <a16:creationId xmlns:a16="http://schemas.microsoft.com/office/drawing/2014/main" id="{20175CDB-5BAB-9A30-CB36-D58FD733ED4B}"/>
-                </a:ext>
-              </a:extLst>
-            </p:cNvPr>
-            <p:cNvSpPr/>
-            <p:nvPr/>
-          </p:nvSpPr>
-          <p:spPr>
-            <a:xfrm>
-              <a:off x="6095999" y="2123351"/>
-              <a:ext cx="2005586" cy="304937"/>
-            </a:xfrm>
-            <a:prstGeom prst="roundRect">
-              <a:avLst/>
-            </a:prstGeom>
-            <a:solidFill>
-              <a:schemeClr val="accent5">
-                <a:lumMod val="60000"/>
-                <a:lumOff val="40000"/>
-              </a:schemeClr>
-            </a:solidFill>
-          </p:spPr>
-          <p:style>
-            <a:lnRef idx="3">
-              <a:schemeClr val="lt1"/>
-            </a:lnRef>
-            <a:fillRef idx="1">
-              <a:schemeClr val="accent3"/>
-            </a:fillRef>
-            <a:effectRef idx="1">
-              <a:schemeClr val="accent3"/>
-            </a:effectRef>
-            <a:fontRef idx="minor">
-              <a:schemeClr val="lt1"/>
-            </a:fontRef>
-          </p:style>
-          <p:txBody>
-            <a:bodyPr rtlCol="0" anchor="ctr"/>
-            <a:lstStyle/>
-            <a:p>
-              <a:pPr algn="ctr"/>
-              <a:r>
-                <a:rPr lang="en-GB" sz="1600" dirty="0"/>
-                <a:t>Symmetric padding</a:t>
-              </a:r>
-            </a:p>
-          </p:txBody>
-        </p:sp>
-        <p:sp>
-          <p:nvSpPr>
-            <p:cNvPr id="28" name="Rettangolo con angoli arrotondati 27">
-              <a:extLst>
-                <a:ext uri="{FF2B5EF4-FFF2-40B4-BE49-F238E27FC236}">
-                  <a16:creationId xmlns:a16="http://schemas.microsoft.com/office/drawing/2014/main" id="{F3BC79E2-C758-E8AA-E225-173DD9E42BF2}"/>
-                </a:ext>
-              </a:extLst>
-            </p:cNvPr>
-            <p:cNvSpPr/>
-            <p:nvPr/>
-          </p:nvSpPr>
-          <p:spPr>
-            <a:xfrm>
-              <a:off x="6089903" y="4004835"/>
-              <a:ext cx="2005586" cy="571638"/>
-            </a:xfrm>
-            <a:prstGeom prst="roundRect">
-              <a:avLst/>
-            </a:prstGeom>
-            <a:solidFill>
-              <a:schemeClr val="accent6">
-                <a:lumMod val="60000"/>
-                <a:lumOff val="40000"/>
-              </a:schemeClr>
-            </a:solidFill>
-          </p:spPr>
-          <p:style>
-            <a:lnRef idx="3">
-              <a:schemeClr val="lt1"/>
-            </a:lnRef>
-            <a:fillRef idx="1">
-              <a:schemeClr val="accent3"/>
-            </a:fillRef>
-            <a:effectRef idx="1">
-              <a:schemeClr val="accent3"/>
-            </a:effectRef>
-            <a:fontRef idx="minor">
-              <a:schemeClr val="lt1"/>
-            </a:fontRef>
-          </p:style>
-          <p:txBody>
-            <a:bodyPr rtlCol="0" anchor="ctr"/>
-            <a:lstStyle/>
-            <a:p>
-              <a:pPr algn="ctr"/>
-              <a:r>
-                <a:rPr lang="en-GB" sz="1600" dirty="0"/>
-                <a:t>De-padding and DWT reconstruction</a:t>
-              </a:r>
-            </a:p>
-          </p:txBody>
-        </p:sp>
-        <p:sp>
-          <p:nvSpPr>
-            <p:cNvPr id="29" name="Rettangolo con angoli arrotondati 28">
-              <a:extLst>
-                <a:ext uri="{FF2B5EF4-FFF2-40B4-BE49-F238E27FC236}">
-                  <a16:creationId xmlns:a16="http://schemas.microsoft.com/office/drawing/2014/main" id="{992B7B0A-3052-3273-E0FF-2B5853D5A4B7}"/>
-                </a:ext>
-              </a:extLst>
-            </p:cNvPr>
-            <p:cNvSpPr/>
-            <p:nvPr/>
-          </p:nvSpPr>
-          <p:spPr>
-            <a:xfrm>
-              <a:off x="6095999" y="4794247"/>
-              <a:ext cx="2005586" cy="571638"/>
-            </a:xfrm>
-            <a:prstGeom prst="roundRect">
-              <a:avLst/>
-            </a:prstGeom>
-            <a:solidFill>
-              <a:schemeClr val="tx2">
-                <a:lumMod val="60000"/>
-                <a:lumOff val="40000"/>
-              </a:schemeClr>
-            </a:solidFill>
-          </p:spPr>
-          <p:style>
-            <a:lnRef idx="3">
-              <a:schemeClr val="lt1"/>
-            </a:lnRef>
-            <a:fillRef idx="1">
-              <a:schemeClr val="accent3"/>
-            </a:fillRef>
-            <a:effectRef idx="1">
-              <a:schemeClr val="accent3"/>
-            </a:effectRef>
-            <a:fontRef idx="minor">
-              <a:schemeClr val="lt1"/>
-            </a:fontRef>
-          </p:style>
-          <p:txBody>
-            <a:bodyPr rtlCol="0" anchor="ctr"/>
-            <a:lstStyle/>
-            <a:p>
-              <a:pPr algn="ctr"/>
-              <a:r>
-                <a:rPr lang="en-GB" sz="1600" dirty="0"/>
-                <a:t>Butterworth HP filter </a:t>
-              </a:r>
-              <a:r>
-                <a:rPr lang="en-GB" sz="1100" dirty="0"/>
-                <a:t>(order 6, cutoff at 0.5 Hz)</a:t>
-              </a:r>
-              <a:endParaRPr lang="en-GB" sz="1600" dirty="0"/>
-            </a:p>
-          </p:txBody>
-        </p:sp>
-        <p:sp>
-          <p:nvSpPr>
-            <p:cNvPr id="30" name="Rettangolo con angoli arrotondati 29">
-              <a:extLst>
-                <a:ext uri="{FF2B5EF4-FFF2-40B4-BE49-F238E27FC236}">
-                  <a16:creationId xmlns:a16="http://schemas.microsoft.com/office/drawing/2014/main" id="{CB1C513A-C012-BC23-53A5-3931C09A8224}"/>
-                </a:ext>
-              </a:extLst>
-            </p:cNvPr>
-            <p:cNvSpPr/>
-            <p:nvPr/>
-          </p:nvSpPr>
-          <p:spPr>
-            <a:xfrm>
-              <a:off x="6095999" y="5603312"/>
-              <a:ext cx="2005586" cy="571638"/>
-            </a:xfrm>
-            <a:prstGeom prst="roundRect">
-              <a:avLst/>
-            </a:prstGeom>
-            <a:solidFill>
-              <a:schemeClr val="tx2">
-                <a:lumMod val="60000"/>
-                <a:lumOff val="40000"/>
-              </a:schemeClr>
-            </a:solidFill>
-          </p:spPr>
-          <p:style>
-            <a:lnRef idx="3">
-              <a:schemeClr val="lt1"/>
-            </a:lnRef>
-            <a:fillRef idx="1">
-              <a:schemeClr val="accent3"/>
-            </a:fillRef>
-            <a:effectRef idx="1">
-              <a:schemeClr val="accent3"/>
-            </a:effectRef>
-            <a:fontRef idx="minor">
-              <a:schemeClr val="lt1"/>
-            </a:fontRef>
-          </p:style>
-          <p:txBody>
-            <a:bodyPr rtlCol="0" anchor="ctr"/>
-            <a:lstStyle/>
-            <a:p>
-              <a:pPr algn="ctr"/>
-              <a:r>
-                <a:rPr lang="en-GB" sz="1600" dirty="0"/>
-                <a:t>Butterworth LP filter </a:t>
-              </a:r>
-              <a:r>
-                <a:rPr lang="en-GB" sz="1100" dirty="0"/>
-                <a:t>(order 6, cutoff at 45 Hz)</a:t>
-              </a:r>
-              <a:endParaRPr lang="en-GB" sz="1600" dirty="0"/>
-            </a:p>
-          </p:txBody>
-        </p:sp>
-        <p:sp>
-          <p:nvSpPr>
-            <p:cNvPr id="31" name="Rettangolo con angoli arrotondati 30">
-              <a:extLst>
-                <a:ext uri="{FF2B5EF4-FFF2-40B4-BE49-F238E27FC236}">
-                  <a16:creationId xmlns:a16="http://schemas.microsoft.com/office/drawing/2014/main" id="{93C9EB82-C465-94BF-BF8B-71F13A881C4E}"/>
-                </a:ext>
-              </a:extLst>
-            </p:cNvPr>
-            <p:cNvSpPr/>
-            <p:nvPr/>
-          </p:nvSpPr>
-          <p:spPr>
-            <a:xfrm>
-              <a:off x="8311136" y="2143231"/>
-              <a:ext cx="2980944" cy="265176"/>
+              <a:off x="8389622" y="2623178"/>
+              <a:ext cx="2980944" cy="304936"/>
             </a:xfrm>
             <a:prstGeom prst="roundRect">
               <a:avLst/>
@@ -32848,7 +33672,7 @@
               <a:pPr algn="ctr"/>
               <a:r>
                 <a:rPr lang="en-GB" sz="1050" dirty="0"/>
-                <a:t>Improves the overall wavelet transformation </a:t>
+                <a:t>Symlets 4 wavelet is used due to its good performances on ECG signals </a:t>
               </a:r>
               <a:r>
                 <a:rPr lang="en-GB" sz="1050" dirty="0">
@@ -32858,761 +33682,59 @@
                     </a:schemeClr>
                   </a:solidFill>
                 </a:rPr>
-                <a:t>[3] </a:t>
+                <a:t>[2, 3] </a:t>
               </a:r>
             </a:p>
           </p:txBody>
         </p:sp>
-        <mc:AlternateContent xmlns:mc="http://schemas.openxmlformats.org/markup-compatibility/2006" xmlns:a14="http://schemas.microsoft.com/office/drawing/2010/main">
-          <mc:Choice Requires="a14">
-            <p:sp>
-              <p:nvSpPr>
-                <p:cNvPr id="32" name="Rettangolo con angoli arrotondati 31">
-                  <a:extLst>
-                    <a:ext uri="{FF2B5EF4-FFF2-40B4-BE49-F238E27FC236}">
-                      <a16:creationId xmlns:a16="http://schemas.microsoft.com/office/drawing/2014/main" id="{44898CE4-3B97-0EBF-D8EE-65470AA7116D}"/>
-                    </a:ext>
-                  </a:extLst>
-                </p:cNvPr>
-                <p:cNvSpPr/>
-                <p:nvPr/>
-              </p:nvSpPr>
-              <p:spPr>
-                <a:xfrm>
-                  <a:off x="8311136" y="3196463"/>
-                  <a:ext cx="3493042" cy="571638"/>
-                </a:xfrm>
-                <a:prstGeom prst="roundRect">
-                  <a:avLst/>
-                </a:prstGeom>
-                <a:noFill/>
-                <a:ln w="9525" cap="flat" cmpd="sng" algn="ctr">
-                  <a:solidFill>
-                    <a:schemeClr val="dk1"/>
-                  </a:solidFill>
-                  <a:prstDash val="solid"/>
-                  <a:round/>
-                  <a:headEnd type="none" w="med" len="med"/>
-                  <a:tailEnd type="none" w="med" len="med"/>
-                </a:ln>
-              </p:spPr>
-              <p:style>
-                <a:lnRef idx="0">
-                  <a:scrgbClr r="0" g="0" b="0"/>
-                </a:lnRef>
-                <a:fillRef idx="0">
-                  <a:scrgbClr r="0" g="0" b="0"/>
-                </a:fillRef>
-                <a:effectRef idx="0">
-                  <a:scrgbClr r="0" g="0" b="0"/>
-                </a:effectRef>
-                <a:fontRef idx="minor">
-                  <a:schemeClr val="dk1"/>
-                </a:fontRef>
-              </p:style>
-              <p:txBody>
-                <a:bodyPr rtlCol="0" anchor="ctr"/>
-                <a:lstStyle/>
-                <a:p>
-                  <a:pPr algn="ctr"/>
-                  <a:r>
-                    <a:rPr lang="en-GB" sz="1050" dirty="0"/>
-                    <a:t>Uses noise variance estimation to fix a threshold under which DWT coefficients are set to zero: </a:t>
-                  </a:r>
-                  <a14:m>
-                    <m:oMath xmlns:m="http://schemas.openxmlformats.org/officeDocument/2006/math">
-                      <m:r>
-                        <m:rPr>
-                          <m:sty m:val="p"/>
-                        </m:rPr>
-                        <a:rPr lang="it-IT" sz="1050" b="0" i="0" smtClean="0">
-                          <a:latin typeface="Cambria Math" panose="02040503050406030204" pitchFamily="18" charset="0"/>
-                        </a:rPr>
-                        <m:t>th</m:t>
-                      </m:r>
-                      <m:r>
-                        <a:rPr lang="it-IT" sz="1050" b="0" i="0" smtClean="0">
-                          <a:latin typeface="Cambria Math" panose="02040503050406030204" pitchFamily="18" charset="0"/>
-                        </a:rPr>
-                        <m:t>= </m:t>
-                      </m:r>
-                      <m:r>
-                        <a:rPr lang="it-IT" sz="1050" b="0" i="1" smtClean="0">
-                          <a:latin typeface="Cambria Math" panose="02040503050406030204" pitchFamily="18" charset="0"/>
-                        </a:rPr>
-                        <m:t>𝜎</m:t>
-                      </m:r>
-                      <m:rad>
-                        <m:radPr>
-                          <m:degHide m:val="on"/>
-                          <m:ctrlPr>
-                            <a:rPr lang="it-IT" sz="1050" b="0" i="1" smtClean="0">
-                              <a:latin typeface="Cambria Math" panose="02040503050406030204" pitchFamily="18" charset="0"/>
-                            </a:rPr>
-                          </m:ctrlPr>
-                        </m:radPr>
-                        <m:deg/>
-                        <m:e>
-                          <m:r>
-                            <a:rPr lang="it-IT" sz="1050" b="0" i="1" smtClean="0">
-                              <a:latin typeface="Cambria Math" panose="02040503050406030204" pitchFamily="18" charset="0"/>
-                            </a:rPr>
-                            <m:t>2</m:t>
-                          </m:r>
-                          <m:r>
-                            <m:rPr>
-                              <m:sty m:val="p"/>
-                            </m:rPr>
-                            <a:rPr lang="it-IT" sz="1050" b="0" i="0" smtClean="0">
-                              <a:latin typeface="Cambria Math" panose="02040503050406030204" pitchFamily="18" charset="0"/>
-                            </a:rPr>
-                            <m:t>log</m:t>
-                          </m:r>
-                          <m:r>
-                            <a:rPr lang="it-IT" sz="1050" b="0" i="1" smtClean="0">
-                              <a:latin typeface="Cambria Math" panose="02040503050406030204" pitchFamily="18" charset="0"/>
-                            </a:rPr>
-                            <m:t>⁡(</m:t>
-                          </m:r>
-                          <m:r>
-                            <a:rPr lang="it-IT" sz="1050" b="0" i="1" smtClean="0">
-                              <a:latin typeface="Cambria Math" panose="02040503050406030204" pitchFamily="18" charset="0"/>
-                            </a:rPr>
-                            <m:t>𝑀</m:t>
-                          </m:r>
-                          <m:r>
-                            <a:rPr lang="it-IT" sz="1050" b="0" i="1" smtClean="0">
-                              <a:latin typeface="Cambria Math" panose="02040503050406030204" pitchFamily="18" charset="0"/>
-                            </a:rPr>
-                            <m:t>)</m:t>
-                          </m:r>
-                        </m:e>
-                      </m:rad>
-                    </m:oMath>
-                  </a14:m>
-                  <a:r>
-                    <a:rPr lang="en-GB" sz="1050" dirty="0"/>
-                    <a:t> where M is the sample size </a:t>
-                  </a:r>
-                  <a:r>
-                    <a:rPr lang="en-GB" sz="1050" dirty="0">
-                      <a:solidFill>
-                        <a:schemeClr val="bg2">
-                          <a:lumMod val="75000"/>
-                        </a:schemeClr>
-                      </a:solidFill>
-                    </a:rPr>
-                    <a:t>[4] </a:t>
-                  </a:r>
-                </a:p>
-              </p:txBody>
-            </p:sp>
-          </mc:Choice>
-          <mc:Fallback xmlns="">
-            <p:sp>
-              <p:nvSpPr>
-                <p:cNvPr id="32" name="Rettangolo con angoli arrotondati 31">
-                  <a:extLst>
-                    <a:ext uri="{FF2B5EF4-FFF2-40B4-BE49-F238E27FC236}">
-                      <a16:creationId xmlns:a16="http://schemas.microsoft.com/office/drawing/2014/main" id="{44898CE4-3B97-0EBF-D8EE-65470AA7116D}"/>
-                    </a:ext>
-                  </a:extLst>
-                </p:cNvPr>
-                <p:cNvSpPr>
-                  <a:spLocks noRot="1" noChangeAspect="1" noMove="1" noResize="1" noEditPoints="1" noAdjustHandles="1" noChangeArrowheads="1" noChangeShapeType="1" noTextEdit="1"/>
-                </p:cNvSpPr>
-                <p:nvPr/>
-              </p:nvSpPr>
-              <p:spPr>
-                <a:xfrm>
-                  <a:off x="8311136" y="3196463"/>
-                  <a:ext cx="3493042" cy="571638"/>
-                </a:xfrm>
-                <a:prstGeom prst="roundRect">
-                  <a:avLst/>
-                </a:prstGeom>
-                <a:blipFill>
-                  <a:blip r:embed="rId3"/>
-                  <a:stretch>
-                    <a:fillRect t="-1042" b="-8333"/>
-                  </a:stretch>
-                </a:blipFill>
-                <a:ln w="9525" cap="flat" cmpd="sng" algn="ctr">
-                  <a:solidFill>
-                    <a:schemeClr val="dk1"/>
-                  </a:solidFill>
-                  <a:prstDash val="solid"/>
-                  <a:round/>
-                  <a:headEnd type="none" w="med" len="med"/>
-                  <a:tailEnd type="none" w="med" len="med"/>
-                </a:ln>
-              </p:spPr>
-              <p:txBody>
-                <a:bodyPr/>
-                <a:lstStyle/>
-                <a:p>
-                  <a:r>
-                    <a:rPr lang="it-IT">
-                      <a:noFill/>
-                    </a:rPr>
-                    <a:t> </a:t>
-                  </a:r>
-                </a:p>
-              </p:txBody>
-            </p:sp>
-          </mc:Fallback>
-        </mc:AlternateContent>
-        <p:sp>
-          <p:nvSpPr>
-            <p:cNvPr id="33" name="Rettangolo con angoli arrotondati 32">
-              <a:extLst>
-                <a:ext uri="{FF2B5EF4-FFF2-40B4-BE49-F238E27FC236}">
-                  <a16:creationId xmlns:a16="http://schemas.microsoft.com/office/drawing/2014/main" id="{EFD88835-0A5E-4758-9CCD-BC563841D6C9}"/>
-                </a:ext>
-              </a:extLst>
-            </p:cNvPr>
-            <p:cNvSpPr/>
-            <p:nvPr/>
-          </p:nvSpPr>
-          <p:spPr>
-            <a:xfrm>
-              <a:off x="8311136" y="4957430"/>
-              <a:ext cx="2080258" cy="245272"/>
-            </a:xfrm>
-            <a:prstGeom prst="roundRect">
-              <a:avLst/>
-            </a:prstGeom>
-            <a:noFill/>
-            <a:ln w="9525" cap="flat" cmpd="sng" algn="ctr">
-              <a:solidFill>
-                <a:schemeClr val="dk1"/>
-              </a:solidFill>
-              <a:prstDash val="solid"/>
-              <a:round/>
-              <a:headEnd type="none" w="med" len="med"/>
-              <a:tailEnd type="none" w="med" len="med"/>
-            </a:ln>
-          </p:spPr>
-          <p:style>
-            <a:lnRef idx="0">
-              <a:scrgbClr r="0" g="0" b="0"/>
-            </a:lnRef>
-            <a:fillRef idx="0">
-              <a:scrgbClr r="0" g="0" b="0"/>
-            </a:fillRef>
-            <a:effectRef idx="0">
-              <a:scrgbClr r="0" g="0" b="0"/>
-            </a:effectRef>
-            <a:fontRef idx="minor">
-              <a:schemeClr val="dk1"/>
-            </a:fontRef>
-          </p:style>
-          <p:txBody>
-            <a:bodyPr rtlCol="0" anchor="ctr"/>
-            <a:lstStyle/>
-            <a:p>
-              <a:pPr algn="ctr"/>
-              <a:r>
-                <a:rPr lang="en-GB" sz="1050" dirty="0"/>
-                <a:t>Removes low frequency drift </a:t>
-              </a:r>
-              <a:r>
-                <a:rPr lang="en-GB" sz="1050" dirty="0">
-                  <a:solidFill>
-                    <a:schemeClr val="bg2">
-                      <a:lumMod val="75000"/>
-                    </a:schemeClr>
-                  </a:solidFill>
-                </a:rPr>
-                <a:t>[2] </a:t>
-              </a:r>
-            </a:p>
-          </p:txBody>
-        </p:sp>
-        <p:sp>
-          <p:nvSpPr>
-            <p:cNvPr id="34" name="Rettangolo con angoli arrotondati 33">
-              <a:extLst>
-                <a:ext uri="{FF2B5EF4-FFF2-40B4-BE49-F238E27FC236}">
-                  <a16:creationId xmlns:a16="http://schemas.microsoft.com/office/drawing/2014/main" id="{69C04314-41DE-2818-631F-F894D3301CDD}"/>
-                </a:ext>
-              </a:extLst>
-            </p:cNvPr>
-            <p:cNvSpPr/>
-            <p:nvPr/>
-          </p:nvSpPr>
-          <p:spPr>
-            <a:xfrm>
-              <a:off x="8311136" y="5766495"/>
-              <a:ext cx="2610864" cy="245272"/>
-            </a:xfrm>
-            <a:prstGeom prst="roundRect">
-              <a:avLst/>
-            </a:prstGeom>
-            <a:noFill/>
-            <a:ln w="9525" cap="flat" cmpd="sng" algn="ctr">
-              <a:solidFill>
-                <a:schemeClr val="dk1"/>
-              </a:solidFill>
-              <a:prstDash val="solid"/>
-              <a:round/>
-              <a:headEnd type="none" w="med" len="med"/>
-              <a:tailEnd type="none" w="med" len="med"/>
-            </a:ln>
-          </p:spPr>
-          <p:style>
-            <a:lnRef idx="0">
-              <a:scrgbClr r="0" g="0" b="0"/>
-            </a:lnRef>
-            <a:fillRef idx="0">
-              <a:scrgbClr r="0" g="0" b="0"/>
-            </a:fillRef>
-            <a:effectRef idx="0">
-              <a:scrgbClr r="0" g="0" b="0"/>
-            </a:effectRef>
-            <a:fontRef idx="minor">
-              <a:schemeClr val="dk1"/>
-            </a:fontRef>
-          </p:style>
-          <p:txBody>
-            <a:bodyPr rtlCol="0" anchor="ctr"/>
-            <a:lstStyle/>
-            <a:p>
-              <a:pPr algn="ctr"/>
-              <a:r>
-                <a:rPr lang="en-GB" sz="1050" dirty="0"/>
-                <a:t>Removes High frequency noise residuals </a:t>
-              </a:r>
-              <a:r>
-                <a:rPr lang="en-GB" sz="1050" dirty="0">
-                  <a:solidFill>
-                    <a:schemeClr val="bg2">
-                      <a:lumMod val="75000"/>
-                    </a:schemeClr>
-                  </a:solidFill>
-                </a:rPr>
-                <a:t>[2] </a:t>
-              </a:r>
-            </a:p>
-          </p:txBody>
-        </p:sp>
-        <p:sp>
-          <p:nvSpPr>
-            <p:cNvPr id="35" name="Rettangolo con angoli arrotondati 34">
-              <a:extLst>
-                <a:ext uri="{FF2B5EF4-FFF2-40B4-BE49-F238E27FC236}">
-                  <a16:creationId xmlns:a16="http://schemas.microsoft.com/office/drawing/2014/main" id="{374D58F7-54FC-9F21-5235-8EE790D41D94}"/>
-                </a:ext>
-              </a:extLst>
-            </p:cNvPr>
-            <p:cNvSpPr/>
-            <p:nvPr/>
-          </p:nvSpPr>
-          <p:spPr>
-            <a:xfrm>
-              <a:off x="5980177" y="1984249"/>
-              <a:ext cx="5971031" cy="4325112"/>
-            </a:xfrm>
-            <a:prstGeom prst="roundRect">
-              <a:avLst>
-                <a:gd name="adj" fmla="val 4447"/>
-              </a:avLst>
-            </a:prstGeom>
-            <a:noFill/>
-            <a:ln w="12700" cap="flat" cmpd="sng" algn="ctr">
-              <a:solidFill>
-                <a:schemeClr val="dk1"/>
-              </a:solidFill>
-              <a:prstDash val="solid"/>
-              <a:round/>
-              <a:headEnd type="none" w="med" len="med"/>
-              <a:tailEnd type="none" w="med" len="med"/>
-            </a:ln>
-          </p:spPr>
-          <p:style>
-            <a:lnRef idx="0">
-              <a:scrgbClr r="0" g="0" b="0"/>
-            </a:lnRef>
-            <a:fillRef idx="0">
-              <a:scrgbClr r="0" g="0" b="0"/>
-            </a:fillRef>
-            <a:effectRef idx="0">
-              <a:scrgbClr r="0" g="0" b="0"/>
-            </a:effectRef>
-            <a:fontRef idx="minor">
-              <a:schemeClr val="dk1"/>
-            </a:fontRef>
-          </p:style>
-          <p:txBody>
-            <a:bodyPr rtlCol="0" anchor="ctr"/>
-            <a:lstStyle/>
-            <a:p>
-              <a:pPr algn="ctr"/>
-              <a:endParaRPr lang="it-IT" dirty="0"/>
-            </a:p>
-          </p:txBody>
-        </p:sp>
-        <p:cxnSp>
-          <p:nvCxnSpPr>
-            <p:cNvPr id="43" name="Connettore 2 42">
-              <a:extLst>
-                <a:ext uri="{FF2B5EF4-FFF2-40B4-BE49-F238E27FC236}">
-                  <a16:creationId xmlns:a16="http://schemas.microsoft.com/office/drawing/2014/main" id="{84CCD13B-4DFB-B650-196B-6E8020D2B65D}"/>
-                </a:ext>
-              </a:extLst>
-            </p:cNvPr>
-            <p:cNvCxnSpPr>
-              <a:cxnSpLocks/>
-              <a:stCxn id="23" idx="2"/>
-              <a:endCxn id="27" idx="0"/>
-            </p:cNvCxnSpPr>
-            <p:nvPr/>
-          </p:nvCxnSpPr>
-          <p:spPr>
-            <a:xfrm>
-              <a:off x="7098792" y="1775794"/>
-              <a:ext cx="0" cy="347557"/>
-            </a:xfrm>
-            <a:prstGeom prst="straightConnector1">
-              <a:avLst/>
-            </a:prstGeom>
-            <a:ln>
-              <a:tailEnd type="triangle"/>
-            </a:ln>
-          </p:spPr>
-          <p:style>
-            <a:lnRef idx="1">
-              <a:schemeClr val="dk1"/>
-            </a:lnRef>
-            <a:fillRef idx="0">
-              <a:schemeClr val="dk1"/>
-            </a:fillRef>
-            <a:effectRef idx="0">
-              <a:schemeClr val="dk1"/>
-            </a:effectRef>
-            <a:fontRef idx="minor">
-              <a:schemeClr val="tx1"/>
-            </a:fontRef>
-          </p:style>
-        </p:cxnSp>
-        <p:cxnSp>
-          <p:nvCxnSpPr>
-            <p:cNvPr id="45" name="Connettore 2 44">
-              <a:extLst>
-                <a:ext uri="{FF2B5EF4-FFF2-40B4-BE49-F238E27FC236}">
-                  <a16:creationId xmlns:a16="http://schemas.microsoft.com/office/drawing/2014/main" id="{8A13818F-2046-6C1E-668C-F6B4CC3781EA}"/>
-                </a:ext>
-              </a:extLst>
-            </p:cNvPr>
-            <p:cNvCxnSpPr>
-              <a:cxnSpLocks/>
-              <a:stCxn id="27" idx="2"/>
-              <a:endCxn id="24" idx="0"/>
-            </p:cNvCxnSpPr>
-            <p:nvPr/>
-          </p:nvCxnSpPr>
-          <p:spPr>
-            <a:xfrm>
-              <a:off x="7098792" y="2428288"/>
-              <a:ext cx="0" cy="233324"/>
-            </a:xfrm>
-            <a:prstGeom prst="straightConnector1">
-              <a:avLst/>
-            </a:prstGeom>
-            <a:ln>
-              <a:tailEnd type="triangle"/>
-            </a:ln>
-          </p:spPr>
-          <p:style>
-            <a:lnRef idx="1">
-              <a:schemeClr val="dk1"/>
-            </a:lnRef>
-            <a:fillRef idx="0">
-              <a:schemeClr val="dk1"/>
-            </a:fillRef>
-            <a:effectRef idx="0">
-              <a:schemeClr val="dk1"/>
-            </a:effectRef>
-            <a:fontRef idx="minor">
-              <a:schemeClr val="tx1"/>
-            </a:fontRef>
-          </p:style>
-        </p:cxnSp>
-        <p:cxnSp>
-          <p:nvCxnSpPr>
-            <p:cNvPr id="53" name="Connettore 2 52">
-              <a:extLst>
-                <a:ext uri="{FF2B5EF4-FFF2-40B4-BE49-F238E27FC236}">
-                  <a16:creationId xmlns:a16="http://schemas.microsoft.com/office/drawing/2014/main" id="{C05978EC-9E8C-E143-8232-940CFF5EDE87}"/>
-                </a:ext>
-              </a:extLst>
-            </p:cNvPr>
-            <p:cNvCxnSpPr>
-              <a:cxnSpLocks/>
-              <a:stCxn id="24" idx="2"/>
-              <a:endCxn id="25" idx="0"/>
-            </p:cNvCxnSpPr>
-            <p:nvPr/>
-          </p:nvCxnSpPr>
-          <p:spPr>
-            <a:xfrm flipH="1">
-              <a:off x="7095744" y="2966549"/>
-              <a:ext cx="3048" cy="233324"/>
-            </a:xfrm>
-            <a:prstGeom prst="straightConnector1">
-              <a:avLst/>
-            </a:prstGeom>
-            <a:ln>
-              <a:tailEnd type="triangle"/>
-            </a:ln>
-          </p:spPr>
-          <p:style>
-            <a:lnRef idx="1">
-              <a:schemeClr val="dk1"/>
-            </a:lnRef>
-            <a:fillRef idx="0">
-              <a:schemeClr val="dk1"/>
-            </a:fillRef>
-            <a:effectRef idx="0">
-              <a:schemeClr val="dk1"/>
-            </a:effectRef>
-            <a:fontRef idx="minor">
-              <a:schemeClr val="tx1"/>
-            </a:fontRef>
-          </p:style>
-        </p:cxnSp>
-        <p:cxnSp>
-          <p:nvCxnSpPr>
-            <p:cNvPr id="61" name="Connettore 2 60">
-              <a:extLst>
-                <a:ext uri="{FF2B5EF4-FFF2-40B4-BE49-F238E27FC236}">
-                  <a16:creationId xmlns:a16="http://schemas.microsoft.com/office/drawing/2014/main" id="{C9EC1F32-FC92-A9C2-3334-1EE981EA4FC7}"/>
-                </a:ext>
-              </a:extLst>
-            </p:cNvPr>
-            <p:cNvCxnSpPr>
-              <a:cxnSpLocks/>
-              <a:stCxn id="25" idx="2"/>
-              <a:endCxn id="28" idx="0"/>
-            </p:cNvCxnSpPr>
-            <p:nvPr/>
-          </p:nvCxnSpPr>
-          <p:spPr>
-            <a:xfrm flipH="1">
-              <a:off x="7092696" y="3771511"/>
-              <a:ext cx="3048" cy="233324"/>
-            </a:xfrm>
-            <a:prstGeom prst="straightConnector1">
-              <a:avLst/>
-            </a:prstGeom>
-            <a:ln>
-              <a:tailEnd type="triangle"/>
-            </a:ln>
-          </p:spPr>
-          <p:style>
-            <a:lnRef idx="1">
-              <a:schemeClr val="dk1"/>
-            </a:lnRef>
-            <a:fillRef idx="0">
-              <a:schemeClr val="dk1"/>
-            </a:fillRef>
-            <a:effectRef idx="0">
-              <a:schemeClr val="dk1"/>
-            </a:effectRef>
-            <a:fontRef idx="minor">
-              <a:schemeClr val="tx1"/>
-            </a:fontRef>
-          </p:style>
-        </p:cxnSp>
-        <p:cxnSp>
-          <p:nvCxnSpPr>
-            <p:cNvPr id="64" name="Connettore 2 63">
-              <a:extLst>
-                <a:ext uri="{FF2B5EF4-FFF2-40B4-BE49-F238E27FC236}">
-                  <a16:creationId xmlns:a16="http://schemas.microsoft.com/office/drawing/2014/main" id="{24DFF073-1230-B9E2-81CC-04DC536B4600}"/>
-                </a:ext>
-              </a:extLst>
-            </p:cNvPr>
-            <p:cNvCxnSpPr>
-              <a:cxnSpLocks/>
-              <a:stCxn id="28" idx="2"/>
-              <a:endCxn id="29" idx="0"/>
-            </p:cNvCxnSpPr>
-            <p:nvPr/>
-          </p:nvCxnSpPr>
-          <p:spPr>
-            <a:xfrm>
-              <a:off x="7092696" y="4576473"/>
-              <a:ext cx="6096" cy="217774"/>
-            </a:xfrm>
-            <a:prstGeom prst="straightConnector1">
-              <a:avLst/>
-            </a:prstGeom>
-            <a:ln>
-              <a:tailEnd type="triangle"/>
-            </a:ln>
-          </p:spPr>
-          <p:style>
-            <a:lnRef idx="1">
-              <a:schemeClr val="dk1"/>
-            </a:lnRef>
-            <a:fillRef idx="0">
-              <a:schemeClr val="dk1"/>
-            </a:fillRef>
-            <a:effectRef idx="0">
-              <a:schemeClr val="dk1"/>
-            </a:effectRef>
-            <a:fontRef idx="minor">
-              <a:schemeClr val="tx1"/>
-            </a:fontRef>
-          </p:style>
-        </p:cxnSp>
-        <p:cxnSp>
-          <p:nvCxnSpPr>
-            <p:cNvPr id="68" name="Connettore 2 67">
-              <a:extLst>
-                <a:ext uri="{FF2B5EF4-FFF2-40B4-BE49-F238E27FC236}">
-                  <a16:creationId xmlns:a16="http://schemas.microsoft.com/office/drawing/2014/main" id="{8E802D19-9A41-B50C-1408-9C010EDDD599}"/>
-                </a:ext>
-              </a:extLst>
-            </p:cNvPr>
-            <p:cNvCxnSpPr>
-              <a:cxnSpLocks/>
-              <a:stCxn id="29" idx="2"/>
-              <a:endCxn id="30" idx="0"/>
-            </p:cNvCxnSpPr>
-            <p:nvPr/>
-          </p:nvCxnSpPr>
-          <p:spPr>
-            <a:xfrm>
-              <a:off x="7098792" y="5365885"/>
-              <a:ext cx="0" cy="237427"/>
-            </a:xfrm>
-            <a:prstGeom prst="straightConnector1">
-              <a:avLst/>
-            </a:prstGeom>
-            <a:ln>
-              <a:tailEnd type="triangle"/>
-            </a:ln>
-          </p:spPr>
-          <p:style>
-            <a:lnRef idx="1">
-              <a:schemeClr val="dk1"/>
-            </a:lnRef>
-            <a:fillRef idx="0">
-              <a:schemeClr val="dk1"/>
-            </a:fillRef>
-            <a:effectRef idx="0">
-              <a:schemeClr val="dk1"/>
-            </a:effectRef>
-            <a:fontRef idx="minor">
-              <a:schemeClr val="tx1"/>
-            </a:fontRef>
-          </p:style>
-        </p:cxnSp>
       </p:grpSp>
       <p:pic>
         <p:nvPicPr>
-          <p:cNvPr id="5" name="Immagine 4" descr="Immagine che contiene testo, linea, diagramma, Diagramma&#10;&#10;Descrizione generata automaticamente">
+          <p:cNvPr id="1026" name="Picture 2">
             <a:extLst>
               <a:ext uri="{FF2B5EF4-FFF2-40B4-BE49-F238E27FC236}">
-                <a16:creationId xmlns:a16="http://schemas.microsoft.com/office/drawing/2014/main" id="{9AF24EF7-E9DC-BC57-71A4-683C919292C3}"/>
+                <a16:creationId xmlns:a16="http://schemas.microsoft.com/office/drawing/2014/main" id="{A90201E9-DCA5-C64F-CEA9-E26EF2237925}"/>
               </a:ext>
             </a:extLst>
           </p:cNvPr>
           <p:cNvPicPr>
-            <a:picLocks noChangeAspect="1"/>
+            <a:picLocks noChangeAspect="1" noChangeArrowheads="1"/>
           </p:cNvPicPr>
           <p:nvPr/>
         </p:nvPicPr>
-        <p:blipFill rotWithShape="1">
-          <a:blip r:embed="rId4">
+        <p:blipFill>
+          <a:blip r:embed="rId5">
             <a:extLst>
               <a:ext uri="{28A0092B-C50C-407E-A947-70E740481C1C}">
                 <a14:useLocalDpi xmlns:a14="http://schemas.microsoft.com/office/drawing/2010/main" val="0"/>
               </a:ext>
             </a:extLst>
           </a:blip>
-          <a:srcRect l="9774" t="4610" r="8287" b="4610"/>
-          <a:stretch/>
+          <a:srcRect/>
+          <a:stretch>
+            <a:fillRect/>
+          </a:stretch>
         </p:blipFill>
-        <p:spPr>
+        <p:spPr bwMode="auto">
           <a:xfrm>
-            <a:off x="543126" y="3443847"/>
-            <a:ext cx="5181017" cy="2827079"/>
+            <a:off x="1203199" y="2928114"/>
+            <a:ext cx="4305569" cy="3229177"/>
           </a:xfrm>
           <a:prstGeom prst="rect">
             <a:avLst/>
           </a:prstGeom>
+          <a:noFill/>
+          <a:extLst>
+            <a:ext uri="{909E8E84-426E-40DD-AFC4-6F175D3DCCD1}">
+              <a14:hiddenFill xmlns:a14="http://schemas.microsoft.com/office/drawing/2010/main">
+                <a:solidFill>
+                  <a:srgbClr val="FFFFFF"/>
+                </a:solidFill>
+              </a14:hiddenFill>
+            </a:ext>
+          </a:extLst>
         </p:spPr>
       </p:pic>
-      <p:sp>
-        <p:nvSpPr>
-          <p:cNvPr id="7" name="Rettangolo con angoli arrotondati 6">
-            <a:extLst>
-              <a:ext uri="{FF2B5EF4-FFF2-40B4-BE49-F238E27FC236}">
-                <a16:creationId xmlns:a16="http://schemas.microsoft.com/office/drawing/2014/main" id="{8F2474CA-E4B8-4F85-C2CD-6D176BF11434}"/>
-              </a:ext>
-            </a:extLst>
-          </p:cNvPr>
-          <p:cNvSpPr/>
-          <p:nvPr/>
-        </p:nvSpPr>
-        <p:spPr>
-          <a:xfrm>
-            <a:off x="8389622" y="2623178"/>
-            <a:ext cx="2980944" cy="304936"/>
-          </a:xfrm>
-          <a:prstGeom prst="roundRect">
-            <a:avLst/>
-          </a:prstGeom>
-          <a:noFill/>
-          <a:ln w="9525" cap="flat" cmpd="sng" algn="ctr">
-            <a:solidFill>
-              <a:schemeClr val="dk1"/>
-            </a:solidFill>
-            <a:prstDash val="solid"/>
-            <a:round/>
-            <a:headEnd type="none" w="med" len="med"/>
-            <a:tailEnd type="none" w="med" len="med"/>
-          </a:ln>
-        </p:spPr>
-        <p:style>
-          <a:lnRef idx="0">
-            <a:scrgbClr r="0" g="0" b="0"/>
-          </a:lnRef>
-          <a:fillRef idx="0">
-            <a:scrgbClr r="0" g="0" b="0"/>
-          </a:fillRef>
-          <a:effectRef idx="0">
-            <a:scrgbClr r="0" g="0" b="0"/>
-          </a:effectRef>
-          <a:fontRef idx="minor">
-            <a:schemeClr val="dk1"/>
-          </a:fontRef>
-        </p:style>
-        <p:txBody>
-          <a:bodyPr rtlCol="0" anchor="ctr"/>
-          <a:lstStyle/>
-          <a:p>
-            <a:pPr algn="ctr"/>
-            <a:r>
-              <a:rPr lang="en-GB" sz="1050" dirty="0"/>
-              <a:t>Level 8 Daubechies wavelet is used due to its good performances on ECG signals </a:t>
-            </a:r>
-            <a:r>
-              <a:rPr lang="en-GB" sz="1050" dirty="0">
-                <a:solidFill>
-                  <a:schemeClr val="bg2">
-                    <a:lumMod val="75000"/>
-                  </a:schemeClr>
-                </a:solidFill>
-              </a:rPr>
-              <a:t>[2, 3] </a:t>
-            </a:r>
-          </a:p>
-        </p:txBody>
-      </p:sp>
     </p:spTree>
     <p:extLst>
       <p:ext uri="{BB962C8B-B14F-4D97-AF65-F5344CB8AC3E}">
@@ -33644,7 +33766,7 @@
                             </p:stCondLst>
                             <p:childTnLst>
                               <p:par>
-                                <p:cTn id="5" presetID="2" presetClass="entr" presetSubtype="4" fill="hold" nodeType="clickEffect">
+                                <p:cTn id="5" presetID="6" presetClass="entr" presetSubtype="32" fill="hold" nodeType="clickEffect">
                                   <p:stCondLst>
                                     <p:cond delay="0"/>
                                   </p:stCondLst>
@@ -33652,6 +33774,94 @@
                                     <p:set>
                                       <p:cBhvr>
                                         <p:cTn id="6" dur="1" fill="hold">
+                                          <p:stCondLst>
+                                            <p:cond delay="0"/>
+                                          </p:stCondLst>
+                                        </p:cTn>
+                                        <p:tgtEl>
+                                          <p:spTgt spid="3"/>
+                                        </p:tgtEl>
+                                        <p:attrNameLst>
+                                          <p:attrName>style.visibility</p:attrName>
+                                        </p:attrNameLst>
+                                      </p:cBhvr>
+                                      <p:to>
+                                        <p:strVal val="visible"/>
+                                      </p:to>
+                                    </p:set>
+                                    <p:animEffect transition="in" filter="circle(out)">
+                                      <p:cBhvr>
+                                        <p:cTn id="7" dur="500"/>
+                                        <p:tgtEl>
+                                          <p:spTgt spid="3"/>
+                                        </p:tgtEl>
+                                      </p:cBhvr>
+                                    </p:animEffect>
+                                  </p:childTnLst>
+                                </p:cTn>
+                              </p:par>
+                              <p:par>
+                                <p:cTn id="8" presetID="6" presetClass="entr" presetSubtype="32" fill="hold" nodeType="withEffect">
+                                  <p:stCondLst>
+                                    <p:cond delay="0"/>
+                                  </p:stCondLst>
+                                  <p:childTnLst>
+                                    <p:set>
+                                      <p:cBhvr>
+                                        <p:cTn id="9" dur="1" fill="hold">
+                                          <p:stCondLst>
+                                            <p:cond delay="0"/>
+                                          </p:stCondLst>
+                                        </p:cTn>
+                                        <p:tgtEl>
+                                          <p:spTgt spid="1026"/>
+                                        </p:tgtEl>
+                                        <p:attrNameLst>
+                                          <p:attrName>style.visibility</p:attrName>
+                                        </p:attrNameLst>
+                                      </p:cBhvr>
+                                      <p:to>
+                                        <p:strVal val="visible"/>
+                                      </p:to>
+                                    </p:set>
+                                    <p:animEffect transition="in" filter="circle(out)">
+                                      <p:cBhvr>
+                                        <p:cTn id="10" dur="500"/>
+                                        <p:tgtEl>
+                                          <p:spTgt spid="1026"/>
+                                        </p:tgtEl>
+                                      </p:cBhvr>
+                                    </p:animEffect>
+                                  </p:childTnLst>
+                                </p:cTn>
+                              </p:par>
+                            </p:childTnLst>
+                          </p:cTn>
+                        </p:par>
+                      </p:childTnLst>
+                    </p:cTn>
+                  </p:par>
+                  <p:par>
+                    <p:cTn id="11" fill="hold">
+                      <p:stCondLst>
+                        <p:cond delay="indefinite"/>
+                      </p:stCondLst>
+                      <p:childTnLst>
+                        <p:par>
+                          <p:cTn id="12" fill="hold">
+                            <p:stCondLst>
+                              <p:cond delay="0"/>
+                            </p:stCondLst>
+                            <p:childTnLst>
+                              <p:par>
+                                <p:cTn id="13" presetID="2" presetClass="entr" presetSubtype="4" fill="hold" nodeType="clickEffect">
+                                  <p:stCondLst>
+                                    <p:cond delay="0"/>
+                                  </p:stCondLst>
+                                  <p:childTnLst>
+                                    <p:set>
+                                      <p:cBhvr>
+                                        <p:cTn id="14" dur="1" fill="hold">
                                           <p:stCondLst>
                                             <p:cond delay="0"/>
                                           </p:stCondLst>
@@ -33673,7 +33883,7 @@
                                     </p:set>
                                     <p:anim calcmode="lin" valueType="num">
                                       <p:cBhvr additive="base">
-                                        <p:cTn id="7" dur="500" fill="hold"/>
+                                        <p:cTn id="15" dur="500" fill="hold"/>
                                         <p:tgtEl>
                                           <p:spTgt spid="22">
                                             <p:txEl>
@@ -33700,7 +33910,7 @@
                                     </p:anim>
                                     <p:anim calcmode="lin" valueType="num">
                                       <p:cBhvr additive="base">
-                                        <p:cTn id="8" dur="500" fill="hold"/>
+                                        <p:cTn id="16" dur="500" fill="hold"/>
                                         <p:tgtEl>
                                           <p:spTgt spid="22">
                                             <p:txEl>
@@ -33729,14 +33939,49 @@
                                 </p:cTn>
                               </p:par>
                               <p:par>
-                                <p:cTn id="9" presetID="6" presetClass="entr" presetSubtype="16" fill="hold" nodeType="withEffect">
+                                <p:cTn id="17" presetID="6" presetClass="exit" presetSubtype="16" fill="hold" nodeType="withEffect">
+                                  <p:stCondLst>
+                                    <p:cond delay="0"/>
+                                  </p:stCondLst>
+                                  <p:childTnLst>
+                                    <p:animEffect transition="out" filter="circle(in)">
+                                      <p:cBhvr>
+                                        <p:cTn id="18" dur="500"/>
+                                        <p:tgtEl>
+                                          <p:spTgt spid="1026"/>
+                                        </p:tgtEl>
+                                      </p:cBhvr>
+                                    </p:animEffect>
+                                    <p:set>
+                                      <p:cBhvr>
+                                        <p:cTn id="19" dur="1" fill="hold">
+                                          <p:stCondLst>
+                                            <p:cond delay="499"/>
+                                          </p:stCondLst>
+                                        </p:cTn>
+                                        <p:tgtEl>
+                                          <p:spTgt spid="1026"/>
+                                        </p:tgtEl>
+                                        <p:attrNameLst>
+                                          <p:attrName>style.visibility</p:attrName>
+                                        </p:attrNameLst>
+                                      </p:cBhvr>
+                                      <p:to>
+                                        <p:strVal val="hidden"/>
+                                      </p:to>
+                                    </p:set>
+                                  </p:childTnLst>
+                                </p:cTn>
+                              </p:par>
+                              <p:par>
+                                <p:cTn id="20" presetID="6" presetClass="entr" presetSubtype="16" fill="hold" nodeType="withEffect">
                                   <p:stCondLst>
                                     <p:cond delay="0"/>
                                   </p:stCondLst>
                                   <p:childTnLst>
                                     <p:set>
                                       <p:cBhvr>
-                                        <p:cTn id="10" dur="1" fill="hold">
+                                        <p:cTn id="21" dur="1" fill="hold">
                                           <p:stCondLst>
                                             <p:cond delay="0"/>
                                           </p:stCondLst>
@@ -33754,7 +33999,7 @@
                                     </p:set>
                                     <p:animEffect transition="in" filter="circle(in)">
                                       <p:cBhvr>
-                                        <p:cTn id="11" dur="500"/>
+                                        <p:cTn id="22" dur="500"/>
                                         <p:tgtEl>
                                           <p:spTgt spid="5"/>
                                         </p:tgtEl>

</xml_diff>

<commit_message>
starting new aligment strategy
</commit_message>
<xml_diff>
--- a/Documentation/3. in-depth spectrum analysis.pptx
+++ b/Documentation/3. in-depth spectrum analysis.pptx
@@ -9321,8 +9321,8 @@
           </a:extLst>
         </p:spPr>
       </p:pic>
-      <mc:AlternateContent xmlns:mc="http://schemas.openxmlformats.org/markup-compatibility/2006">
-        <mc:Choice xmlns:a14="http://schemas.microsoft.com/office/drawing/2010/main" Requires="a14">
+      <mc:AlternateContent xmlns:mc="http://schemas.openxmlformats.org/markup-compatibility/2006" xmlns:a14="http://schemas.microsoft.com/office/drawing/2010/main">
+        <mc:Choice Requires="a14">
           <p:sp>
             <p:nvSpPr>
               <p:cNvPr id="5" name="CasellaDiTesto 4">
@@ -9351,6 +9351,7 @@
               </a:bodyPr>
               <a:lstStyle/>
               <a:p>
+                <a:pPr/>
                 <a14:m>
                   <m:oMathPara xmlns:m="http://schemas.openxmlformats.org/officeDocument/2006/math">
                     <m:oMathParaPr>
@@ -9531,6 +9532,7 @@
                 <a:endParaRPr lang="it-IT" b="0" dirty="0"/>
               </a:p>
               <a:p>
+                <a:pPr/>
                 <a14:m>
                   <m:oMathPara xmlns:m="http://schemas.openxmlformats.org/officeDocument/2006/math">
                     <m:oMathParaPr>
@@ -9666,7 +9668,7 @@
             </p:txBody>
           </p:sp>
         </mc:Choice>
-        <mc:Fallback>
+        <mc:Fallback xmlns="">
           <p:sp>
             <p:nvSpPr>
               <p:cNvPr id="5" name="CasellaDiTesto 4">
@@ -9711,8 +9713,8 @@
           </p:sp>
         </mc:Fallback>
       </mc:AlternateContent>
-      <mc:AlternateContent xmlns:mc="http://schemas.openxmlformats.org/markup-compatibility/2006">
-        <mc:Choice xmlns:a14="http://schemas.microsoft.com/office/drawing/2010/main" Requires="a14">
+      <mc:AlternateContent xmlns:mc="http://schemas.openxmlformats.org/markup-compatibility/2006" xmlns:a14="http://schemas.microsoft.com/office/drawing/2010/main">
+        <mc:Choice Requires="a14">
           <p:sp>
             <p:nvSpPr>
               <p:cNvPr id="8" name="CasellaDiTesto 7">
@@ -9762,6 +9764,7 @@
               </a:bodyPr>
               <a:lstStyle/>
               <a:p>
+                <a:pPr/>
                 <a14:m>
                   <m:oMathPara xmlns:m="http://schemas.openxmlformats.org/officeDocument/2006/math">
                     <m:oMathParaPr>
@@ -10100,7 +10103,7 @@
             </p:txBody>
           </p:sp>
         </mc:Choice>
-        <mc:Fallback>
+        <mc:Fallback xmlns="">
           <p:sp>
             <p:nvSpPr>
               <p:cNvPr id="8" name="CasellaDiTesto 7">
@@ -15955,8 +15958,8 @@
           </a:p>
         </p:txBody>
       </p:sp>
-      <mc:AlternateContent xmlns:mc="http://schemas.openxmlformats.org/markup-compatibility/2006">
-        <mc:Choice xmlns:a14="http://schemas.microsoft.com/office/drawing/2010/main" Requires="a14">
+      <mc:AlternateContent xmlns:mc="http://schemas.openxmlformats.org/markup-compatibility/2006" xmlns:a14="http://schemas.microsoft.com/office/drawing/2010/main">
+        <mc:Choice Requires="a14">
           <p:sp>
             <p:nvSpPr>
               <p:cNvPr id="22" name="Rettangolo con angoli arrotondati 21">
@@ -16001,7 +16004,6 @@
               <a:bodyPr rtlCol="0" anchor="ctr"/>
               <a:lstStyle/>
               <a:p>
-                <a:pPr/>
                 <a:r>
                   <a:rPr lang="en-GB" sz="1600" b="1" i="1" dirty="0">
                     <a:solidFill>
@@ -16268,7 +16270,7 @@
             </p:txBody>
           </p:sp>
         </mc:Choice>
-        <mc:Fallback>
+        <mc:Fallback xmlns="">
           <p:sp>
             <p:nvSpPr>
               <p:cNvPr id="22" name="Rettangolo con angoli arrotondati 21">
@@ -16313,8 +16315,8 @@
           </p:sp>
         </mc:Fallback>
       </mc:AlternateContent>
-      <mc:AlternateContent xmlns:mc="http://schemas.openxmlformats.org/markup-compatibility/2006">
-        <mc:Choice xmlns:a14="http://schemas.microsoft.com/office/drawing/2010/main" Requires="a14">
+      <mc:AlternateContent xmlns:mc="http://schemas.openxmlformats.org/markup-compatibility/2006" xmlns:a14="http://schemas.microsoft.com/office/drawing/2010/main">
+        <mc:Choice Requires="a14">
           <p:sp>
             <p:nvSpPr>
               <p:cNvPr id="23" name="Rettangolo con angoli arrotondati 22">
@@ -16359,7 +16361,6 @@
               <a:bodyPr rtlCol="0" anchor="ctr"/>
               <a:lstStyle/>
               <a:p>
-                <a:pPr/>
                 <a:r>
                   <a:rPr lang="en-GB" sz="1600" b="1" i="1" dirty="0">
                     <a:solidFill>
@@ -16689,7 +16690,7 @@
             </p:txBody>
           </p:sp>
         </mc:Choice>
-        <mc:Fallback>
+        <mc:Fallback xmlns="">
           <p:sp>
             <p:nvSpPr>
               <p:cNvPr id="23" name="Rettangolo con angoli arrotondati 22">
@@ -16734,8 +16735,8 @@
           </p:sp>
         </mc:Fallback>
       </mc:AlternateContent>
-      <mc:AlternateContent xmlns:mc="http://schemas.openxmlformats.org/markup-compatibility/2006">
-        <mc:Choice xmlns:a14="http://schemas.microsoft.com/office/drawing/2010/main" Requires="a14">
+      <mc:AlternateContent xmlns:mc="http://schemas.openxmlformats.org/markup-compatibility/2006" xmlns:a14="http://schemas.microsoft.com/office/drawing/2010/main">
+        <mc:Choice Requires="a14">
           <p:sp>
             <p:nvSpPr>
               <p:cNvPr id="25" name="Rettangolo con angoli arrotondati 24">
@@ -16780,7 +16781,6 @@
               <a:bodyPr rtlCol="0" anchor="ctr"/>
               <a:lstStyle/>
               <a:p>
-                <a:pPr/>
                 <a:r>
                   <a:rPr lang="en-GB" sz="1600" b="1" i="1" dirty="0">
                     <a:solidFill>
@@ -17222,7 +17222,7 @@
             </p:txBody>
           </p:sp>
         </mc:Choice>
-        <mc:Fallback>
+        <mc:Fallback xmlns="">
           <p:sp>
             <p:nvSpPr>
               <p:cNvPr id="25" name="Rettangolo con angoli arrotondati 24">
@@ -17267,8 +17267,8 @@
           </p:sp>
         </mc:Fallback>
       </mc:AlternateContent>
-      <mc:AlternateContent xmlns:mc="http://schemas.openxmlformats.org/markup-compatibility/2006">
-        <mc:Choice xmlns:a14="http://schemas.microsoft.com/office/drawing/2010/main" Requires="a14">
+      <mc:AlternateContent xmlns:mc="http://schemas.openxmlformats.org/markup-compatibility/2006" xmlns:a14="http://schemas.microsoft.com/office/drawing/2010/main">
+        <mc:Choice Requires="a14">
           <p:sp>
             <p:nvSpPr>
               <p:cNvPr id="35" name="Rettangolo con angoli arrotondati 34">
@@ -17322,7 +17322,6 @@
               <a:bodyPr rtlCol="0" anchor="ctr"/>
               <a:lstStyle/>
               <a:p>
-                <a:pPr/>
                 <a:r>
                   <a:rPr lang="en-GB" sz="1600" b="1" i="1" dirty="0">
                     <a:solidFill>
@@ -17641,7 +17640,7 @@
             </p:txBody>
           </p:sp>
         </mc:Choice>
-        <mc:Fallback>
+        <mc:Fallback xmlns="">
           <p:sp>
             <p:nvSpPr>
               <p:cNvPr id="35" name="Rettangolo con angoli arrotondati 34">
@@ -17693,8 +17692,8 @@
           </p:sp>
         </mc:Fallback>
       </mc:AlternateContent>
-      <mc:AlternateContent xmlns:mc="http://schemas.openxmlformats.org/markup-compatibility/2006">
-        <mc:Choice xmlns:a14="http://schemas.microsoft.com/office/drawing/2010/main" Requires="a14">
+      <mc:AlternateContent xmlns:mc="http://schemas.openxmlformats.org/markup-compatibility/2006" xmlns:a14="http://schemas.microsoft.com/office/drawing/2010/main">
+        <mc:Choice Requires="a14">
           <p:sp>
             <p:nvSpPr>
               <p:cNvPr id="36" name="Rettangolo con angoli arrotondati 35">
@@ -17749,7 +17748,6 @@
               <a:bodyPr rtlCol="0" anchor="ctr"/>
               <a:lstStyle/>
               <a:p>
-                <a:pPr/>
                 <a:r>
                   <a:rPr lang="en-GB" sz="1600" b="1" i="1" dirty="0">
                     <a:solidFill>
@@ -18079,7 +18077,7 @@
             </p:txBody>
           </p:sp>
         </mc:Choice>
-        <mc:Fallback>
+        <mc:Fallback xmlns="">
           <p:sp>
             <p:nvSpPr>
               <p:cNvPr id="36" name="Rettangolo con angoli arrotondati 35">
@@ -18131,8 +18129,8 @@
           </p:sp>
         </mc:Fallback>
       </mc:AlternateContent>
-      <mc:AlternateContent xmlns:mc="http://schemas.openxmlformats.org/markup-compatibility/2006">
-        <mc:Choice xmlns:a14="http://schemas.microsoft.com/office/drawing/2010/main" Requires="a14">
+      <mc:AlternateContent xmlns:mc="http://schemas.openxmlformats.org/markup-compatibility/2006" xmlns:a14="http://schemas.microsoft.com/office/drawing/2010/main">
+        <mc:Choice Requires="a14">
           <p:sp>
             <p:nvSpPr>
               <p:cNvPr id="37" name="Rettangolo con angoli arrotondati 36">
@@ -18187,7 +18185,6 @@
               <a:bodyPr rtlCol="0" anchor="ctr"/>
               <a:lstStyle/>
               <a:p>
-                <a:pPr/>
                 <a:r>
                   <a:rPr lang="en-GB" sz="1600" b="1" i="1" dirty="0">
                     <a:solidFill>
@@ -18629,7 +18626,7 @@
             </p:txBody>
           </p:sp>
         </mc:Choice>
-        <mc:Fallback>
+        <mc:Fallback xmlns="">
           <p:sp>
             <p:nvSpPr>
               <p:cNvPr id="37" name="Rettangolo con angoli arrotondati 36">
@@ -23497,8 +23494,8 @@
           </a:p>
         </p:txBody>
       </p:sp>
-      <mc:AlternateContent xmlns:mc="http://schemas.openxmlformats.org/markup-compatibility/2006">
-        <mc:Choice xmlns:a14="http://schemas.microsoft.com/office/drawing/2010/main" Requires="a14">
+      <mc:AlternateContent xmlns:mc="http://schemas.openxmlformats.org/markup-compatibility/2006" xmlns:a14="http://schemas.microsoft.com/office/drawing/2010/main">
+        <mc:Choice Requires="a14">
           <p:sp>
             <p:nvSpPr>
               <p:cNvPr id="3" name="Rettangolo con angoli arrotondati 2">
@@ -23548,7 +23545,6 @@
               <a:bodyPr rtlCol="0" anchor="ctr"/>
               <a:lstStyle/>
               <a:p>
-                <a:pPr/>
                 <a:r>
                   <a:rPr lang="en-GB" sz="1600" b="1" i="1" dirty="0">
                     <a:solidFill>
@@ -23890,7 +23886,6 @@
                 </a:endParaRPr>
               </a:p>
               <a:p>
-                <a:pPr/>
                 <a:endParaRPr lang="en-GB" sz="1400" dirty="0">
                   <a:solidFill>
                     <a:schemeClr val="tx1"/>
@@ -23900,7 +23895,7 @@
             </p:txBody>
           </p:sp>
         </mc:Choice>
-        <mc:Fallback>
+        <mc:Fallback xmlns="">
           <p:sp>
             <p:nvSpPr>
               <p:cNvPr id="3" name="Rettangolo con angoli arrotondati 2">
@@ -23950,8 +23945,8 @@
           </p:sp>
         </mc:Fallback>
       </mc:AlternateContent>
-      <mc:AlternateContent xmlns:mc="http://schemas.openxmlformats.org/markup-compatibility/2006">
-        <mc:Choice xmlns:a14="http://schemas.microsoft.com/office/drawing/2010/main" Requires="a14">
+      <mc:AlternateContent xmlns:mc="http://schemas.openxmlformats.org/markup-compatibility/2006" xmlns:a14="http://schemas.microsoft.com/office/drawing/2010/main">
+        <mc:Choice Requires="a14">
           <p:sp>
             <p:nvSpPr>
               <p:cNvPr id="5" name="Rettangolo con angoli arrotondati 4">
@@ -24001,7 +23996,6 @@
               <a:bodyPr rtlCol="0" anchor="ctr"/>
               <a:lstStyle/>
               <a:p>
-                <a:pPr/>
                 <a:r>
                   <a:rPr lang="en-GB" sz="1600" b="1" i="1" dirty="0">
                     <a:solidFill>
@@ -24692,7 +24686,6 @@
                 </a:endParaRPr>
               </a:p>
               <a:p>
-                <a:pPr/>
                 <a:r>
                   <a:rPr lang="en-GB" sz="1400" dirty="0">
                     <a:solidFill>
@@ -24985,7 +24978,6 @@
                 </a:endParaRPr>
               </a:p>
               <a:p>
-                <a:pPr/>
                 <a:endParaRPr lang="en-GB" sz="1400" dirty="0">
                   <a:solidFill>
                     <a:schemeClr val="tx1"/>
@@ -24993,7 +24985,6 @@
                 </a:endParaRPr>
               </a:p>
               <a:p>
-                <a:pPr/>
                 <a:r>
                   <a:rPr lang="en-GB" sz="1400" dirty="0">
                     <a:solidFill>
@@ -25006,7 +24997,7 @@
             </p:txBody>
           </p:sp>
         </mc:Choice>
-        <mc:Fallback>
+        <mc:Fallback xmlns="">
           <p:sp>
             <p:nvSpPr>
               <p:cNvPr id="5" name="Rettangolo con angoli arrotondati 4">

</xml_diff>